<commit_message>
add tp 0 + slides
</commit_message>
<xml_diff>
--- a/Hands-On -Chaos - SLIDES.pptx
+++ b/Hands-On -Chaos - SLIDES.pptx
@@ -6,10 +6,10 @@
     <p:sldMasterId id="2147483660" r:id="rId2"/>
   </p:sldMasterIdLst>
   <p:notesMasterIdLst>
-    <p:notesMasterId r:id="rId31"/>
+    <p:notesMasterId r:id="rId32"/>
   </p:notesMasterIdLst>
   <p:handoutMasterIdLst>
-    <p:handoutMasterId r:id="rId32"/>
+    <p:handoutMasterId r:id="rId33"/>
   </p:handoutMasterIdLst>
   <p:sldIdLst>
     <p:sldId id="288" r:id="rId3"/>
@@ -21,25 +21,26 @@
     <p:sldId id="333" r:id="rId9"/>
     <p:sldId id="339" r:id="rId10"/>
     <p:sldId id="334" r:id="rId11"/>
-    <p:sldId id="335" r:id="rId12"/>
-    <p:sldId id="352" r:id="rId13"/>
-    <p:sldId id="336" r:id="rId14"/>
-    <p:sldId id="337" r:id="rId15"/>
-    <p:sldId id="338" r:id="rId16"/>
-    <p:sldId id="340" r:id="rId17"/>
-    <p:sldId id="341" r:id="rId18"/>
-    <p:sldId id="342" r:id="rId19"/>
-    <p:sldId id="343" r:id="rId20"/>
-    <p:sldId id="344" r:id="rId21"/>
-    <p:sldId id="345" r:id="rId22"/>
-    <p:sldId id="346" r:id="rId23"/>
-    <p:sldId id="347" r:id="rId24"/>
-    <p:sldId id="353" r:id="rId25"/>
-    <p:sldId id="348" r:id="rId26"/>
-    <p:sldId id="350" r:id="rId27"/>
-    <p:sldId id="349" r:id="rId28"/>
-    <p:sldId id="313" r:id="rId29"/>
-    <p:sldId id="325" r:id="rId30"/>
+    <p:sldId id="354" r:id="rId12"/>
+    <p:sldId id="355" r:id="rId13"/>
+    <p:sldId id="352" r:id="rId14"/>
+    <p:sldId id="336" r:id="rId15"/>
+    <p:sldId id="337" r:id="rId16"/>
+    <p:sldId id="338" r:id="rId17"/>
+    <p:sldId id="340" r:id="rId18"/>
+    <p:sldId id="341" r:id="rId19"/>
+    <p:sldId id="342" r:id="rId20"/>
+    <p:sldId id="343" r:id="rId21"/>
+    <p:sldId id="344" r:id="rId22"/>
+    <p:sldId id="345" r:id="rId23"/>
+    <p:sldId id="346" r:id="rId24"/>
+    <p:sldId id="347" r:id="rId25"/>
+    <p:sldId id="353" r:id="rId26"/>
+    <p:sldId id="348" r:id="rId27"/>
+    <p:sldId id="350" r:id="rId28"/>
+    <p:sldId id="349" r:id="rId29"/>
+    <p:sldId id="313" r:id="rId30"/>
+    <p:sldId id="325" r:id="rId31"/>
   </p:sldIdLst>
   <p:sldSz cx="12192000" cy="6858000"/>
   <p:notesSz cx="6858000" cy="9144000"/>
@@ -156,7 +157,8 @@
             <p14:sldId id="333"/>
             <p14:sldId id="339"/>
             <p14:sldId id="334"/>
-            <p14:sldId id="335"/>
+            <p14:sldId id="354"/>
+            <p14:sldId id="355"/>
             <p14:sldId id="352"/>
             <p14:sldId id="336"/>
             <p14:sldId id="337"/>
@@ -988,7 +990,7 @@
           <a:p>
             <a:fld id="{B35DA622-522A-4B17-9AC4-B01778B7071C}" type="slidenum">
               <a:rPr lang="fr-FR" smtClean="0"/>
-              <a:t>22</a:t>
+              <a:t>23</a:t>
             </a:fld>
             <a:endParaRPr lang="fr-FR"/>
           </a:p>
@@ -1088,7 +1090,7 @@
           <a:p>
             <a:fld id="{B35DA622-522A-4B17-9AC4-B01778B7071C}" type="slidenum">
               <a:rPr lang="fr-FR" smtClean="0"/>
-              <a:t>23</a:t>
+              <a:t>24</a:t>
             </a:fld>
             <a:endParaRPr lang="fr-FR"/>
           </a:p>
@@ -1180,7 +1182,7 @@
           <a:p>
             <a:fld id="{B35DA622-522A-4B17-9AC4-B01778B7071C}" type="slidenum">
               <a:rPr lang="fr-FR" smtClean="0"/>
-              <a:t>24</a:t>
+              <a:t>25</a:t>
             </a:fld>
             <a:endParaRPr lang="fr-FR"/>
           </a:p>
@@ -1272,7 +1274,7 @@
           <a:p>
             <a:fld id="{B35DA622-522A-4B17-9AC4-B01778B7071C}" type="slidenum">
               <a:rPr lang="fr-FR" smtClean="0"/>
-              <a:t>25</a:t>
+              <a:t>26</a:t>
             </a:fld>
             <a:endParaRPr lang="fr-FR"/>
           </a:p>
@@ -2017,7 +2019,7 @@
           <a:p>
             <a:fld id="{B35DA622-522A-4B17-9AC4-B01778B7071C}" type="slidenum">
               <a:rPr lang="fr-FR" smtClean="0"/>
-              <a:t>12</a:t>
+              <a:t>13</a:t>
             </a:fld>
             <a:endParaRPr lang="fr-FR"/>
           </a:p>
@@ -2207,7 +2209,7 @@
           <a:p>
             <a:fld id="{B35DA622-522A-4B17-9AC4-B01778B7071C}" type="slidenum">
               <a:rPr lang="fr-FR" smtClean="0"/>
-              <a:t>15</a:t>
+              <a:t>16</a:t>
             </a:fld>
             <a:endParaRPr lang="fr-FR"/>
           </a:p>
@@ -2307,7 +2309,7 @@
           <a:p>
             <a:fld id="{B35DA622-522A-4B17-9AC4-B01778B7071C}" type="slidenum">
               <a:rPr lang="fr-FR" smtClean="0"/>
-              <a:t>17</a:t>
+              <a:t>18</a:t>
             </a:fld>
             <a:endParaRPr lang="fr-FR"/>
           </a:p>
@@ -2436,7 +2438,7 @@
           <a:p>
             <a:fld id="{B35DA622-522A-4B17-9AC4-B01778B7071C}" type="slidenum">
               <a:rPr lang="fr-FR" smtClean="0"/>
-              <a:t>18</a:t>
+              <a:t>19</a:t>
             </a:fld>
             <a:endParaRPr lang="fr-FR"/>
           </a:p>
@@ -2555,7 +2557,7 @@
           <a:p>
             <a:fld id="{B35DA622-522A-4B17-9AC4-B01778B7071C}" type="slidenum">
               <a:rPr lang="fr-FR" smtClean="0"/>
-              <a:t>20</a:t>
+              <a:t>21</a:t>
             </a:fld>
             <a:endParaRPr lang="fr-FR"/>
           </a:p>
@@ -10484,9 +10486,9 @@
         <p:grpSpPr>
           <a:xfrm>
             <a:off x="0" y="73772"/>
-            <a:ext cx="2943332" cy="883356"/>
+            <a:ext cx="3660454" cy="883356"/>
             <a:chOff x="0" y="-9760"/>
-            <a:chExt cx="2357120" cy="785565"/>
+            <a:chExt cx="2931415" cy="785565"/>
           </a:xfrm>
         </p:grpSpPr>
         <p:sp>
@@ -10498,7 +10500,7 @@
           <p:spPr>
             <a:xfrm>
               <a:off x="109500" y="-9760"/>
-              <a:ext cx="1506083" cy="629520"/>
+              <a:ext cx="2821915" cy="629520"/>
             </a:xfrm>
             <a:prstGeom prst="rect">
               <a:avLst/>
@@ -10512,20 +10514,12 @@
             <a:lstStyle/>
             <a:p>
               <a:r>
-                <a:rPr lang="fr-FR" sz="4000" b="1" dirty="0" err="1" smtClean="0">
-                  <a:latin typeface="Lato Regular" panose="020F0502020204030203" pitchFamily="34" charset="0"/>
-                  <a:ea typeface="Lato Regular" panose="020F0502020204030203" pitchFamily="34" charset="0"/>
-                  <a:cs typeface="Lato Regular" panose="020F0502020204030203" pitchFamily="34" charset="0"/>
-                </a:rPr>
-                <a:t>Pit</a:t>
-              </a:r>
-              <a:r>
                 <a:rPr lang="fr-FR" sz="4000" b="1" dirty="0" smtClean="0">
                   <a:latin typeface="Lato Regular" panose="020F0502020204030203" pitchFamily="34" charset="0"/>
                   <a:ea typeface="Lato Regular" panose="020F0502020204030203" pitchFamily="34" charset="0"/>
                   <a:cs typeface="Lato Regular" panose="020F0502020204030203" pitchFamily="34" charset="0"/>
                 </a:rPr>
-                <a:t> Test</a:t>
+                <a:t>Tests unitaires </a:t>
               </a:r>
               <a:endParaRPr lang="fr-FR" sz="3600" b="1" dirty="0">
                 <a:latin typeface="Lato Regular" panose="020F0502020204030203" pitchFamily="34" charset="0"/>
@@ -10620,8 +10614,8 @@
         </p:nvSpPr>
         <p:spPr>
           <a:xfrm>
-            <a:off x="5630685" y="2364225"/>
-            <a:ext cx="5187715" cy="1323439"/>
+            <a:off x="5095983" y="2364225"/>
+            <a:ext cx="5722418" cy="1015663"/>
           </a:xfrm>
           <a:prstGeom prst="rect">
             <a:avLst/>
@@ -10639,7 +10633,7 @@
               <a:buChar char="-"/>
             </a:pPr>
             <a:r>
-              <a:rPr lang="fr-FR" sz="2000" dirty="0" smtClean="0">
+              <a:rPr lang="fr-FR" sz="2000" dirty="0">
                 <a:solidFill>
                   <a:schemeClr val="tx2"/>
                 </a:solidFill>
@@ -10649,7 +10643,7 @@
               <a:t>Récupérer les sources de </a:t>
             </a:r>
             <a:r>
-              <a:rPr lang="fr-FR" sz="2000" dirty="0" err="1" smtClean="0">
+              <a:rPr lang="fr-FR" sz="2000" dirty="0" err="1">
                 <a:solidFill>
                   <a:schemeClr val="tx2"/>
                 </a:solidFill>
@@ -10658,7 +10652,53 @@
               </a:rPr>
               <a:t>fusiion</a:t>
             </a:r>
-            <a:endParaRPr lang="fr-FR" sz="2000" dirty="0" smtClean="0">
+            <a:r>
+              <a:rPr lang="fr-FR" sz="2000" dirty="0">
+                <a:solidFill>
+                  <a:schemeClr val="tx2"/>
+                </a:solidFill>
+                <a:latin typeface="Lato Regular"/>
+                <a:cs typeface="Lato Regular"/>
+              </a:rPr>
+              <a:t> depuis GIT</a:t>
+            </a:r>
+          </a:p>
+          <a:p>
+            <a:pPr marL="342900" indent="-342900">
+              <a:buFontTx/>
+              <a:buChar char="-"/>
+            </a:pPr>
+            <a:r>
+              <a:rPr lang="fr-FR" sz="2000" dirty="0" smtClean="0">
+                <a:solidFill>
+                  <a:schemeClr val="tx2"/>
+                </a:solidFill>
+                <a:latin typeface="Lato Regular"/>
+                <a:cs typeface="Lato Regular"/>
+              </a:rPr>
+              <a:t>Lancer </a:t>
+            </a:r>
+            <a:r>
+              <a:rPr lang="fr-FR" sz="2000" dirty="0">
+                <a:solidFill>
+                  <a:schemeClr val="tx2"/>
+                </a:solidFill>
+                <a:latin typeface="Lato Regular"/>
+                <a:cs typeface="Lato Regular"/>
+              </a:rPr>
+              <a:t>les tests unitaires </a:t>
+            </a:r>
+            <a:r>
+              <a:rPr lang="fr-FR" sz="2000" dirty="0" err="1">
+                <a:solidFill>
+                  <a:schemeClr val="tx2"/>
+                </a:solidFill>
+                <a:latin typeface="Lato Regular"/>
+                <a:cs typeface="Lato Regular"/>
+              </a:rPr>
+              <a:t>Junit</a:t>
+            </a:r>
+            <a:endParaRPr lang="fr-FR" sz="2000" dirty="0">
               <a:solidFill>
                 <a:schemeClr val="tx2"/>
               </a:solidFill>
@@ -10679,68 +10719,29 @@
                 <a:latin typeface="Lato Regular"/>
                 <a:cs typeface="Lato Regular"/>
               </a:rPr>
-              <a:t>Tests unitaires et couverture de code</a:t>
-            </a:r>
-          </a:p>
-          <a:p>
-            <a:pPr marL="342900" indent="-342900">
-              <a:buFontTx/>
-              <a:buChar char="-"/>
-            </a:pPr>
-            <a:r>
-              <a:rPr lang="fr-FR" sz="2000" dirty="0" smtClean="0">
+              <a:t>Couverture </a:t>
+            </a:r>
+            <a:r>
+              <a:rPr lang="fr-FR" sz="2000" dirty="0">
                 <a:solidFill>
                   <a:schemeClr val="tx2"/>
                 </a:solidFill>
                 <a:latin typeface="Lato Regular"/>
                 <a:cs typeface="Lato Regular"/>
               </a:rPr>
-              <a:t>Ajout de la dépendance de </a:t>
-            </a:r>
-            <a:r>
-              <a:rPr lang="fr-FR" sz="2000" dirty="0" err="1" smtClean="0">
+              <a:t>de </a:t>
+            </a:r>
+            <a:r>
+              <a:rPr lang="fr-FR" sz="2000" dirty="0" smtClean="0">
                 <a:solidFill>
                   <a:schemeClr val="tx2"/>
                 </a:solidFill>
                 <a:latin typeface="Lato Regular"/>
                 <a:cs typeface="Lato Regular"/>
               </a:rPr>
-              <a:t>PitTest</a:t>
-            </a:r>
-            <a:endParaRPr lang="fr-FR" sz="2000" dirty="0" smtClean="0">
-              <a:solidFill>
-                <a:schemeClr val="tx2"/>
-              </a:solidFill>
-              <a:latin typeface="Lato Regular"/>
-              <a:cs typeface="Lato Regular"/>
-            </a:endParaRPr>
-          </a:p>
-          <a:p>
-            <a:pPr marL="342900" indent="-342900">
-              <a:buFontTx/>
-              <a:buChar char="-"/>
-            </a:pPr>
-            <a:r>
-              <a:rPr lang="fr-FR" sz="2000" dirty="0" smtClean="0">
-                <a:solidFill>
-                  <a:schemeClr val="tx2"/>
-                </a:solidFill>
-                <a:latin typeface="Lato Regular"/>
-                <a:cs typeface="Lato Regular"/>
-              </a:rPr>
-              <a:t>Mutation </a:t>
-            </a:r>
-            <a:r>
-              <a:rPr lang="fr-FR" sz="2000" dirty="0" err="1" smtClean="0">
-                <a:solidFill>
-                  <a:schemeClr val="tx2"/>
-                </a:solidFill>
-                <a:latin typeface="Lato Regular"/>
-                <a:cs typeface="Lato Regular"/>
-              </a:rPr>
-              <a:t>coverage</a:t>
-            </a:r>
-            <a:endParaRPr lang="fr-FR" sz="2000" dirty="0" smtClean="0">
+              <a:t>code</a:t>
+            </a:r>
+            <a:endParaRPr lang="fr-FR" sz="2000" dirty="0">
               <a:solidFill>
                 <a:schemeClr val="tx2"/>
               </a:solidFill>
@@ -10753,7 +10754,7 @@
     </p:spTree>
     <p:extLst>
       <p:ext uri="{BB962C8B-B14F-4D97-AF65-F5344CB8AC3E}">
-        <p14:creationId xmlns:p14="http://schemas.microsoft.com/office/powerpoint/2010/main" val="1828673698"/>
+        <p14:creationId xmlns:p14="http://schemas.microsoft.com/office/powerpoint/2010/main" val="2190725808"/>
       </p:ext>
     </p:extLst>
   </p:cSld>
@@ -10932,6 +10933,279 @@
         </p:nvSpPr>
         <p:spPr>
           <a:xfrm>
+            <a:off x="5095983" y="2364225"/>
+            <a:ext cx="5722418" cy="707886"/>
+          </a:xfrm>
+          <a:prstGeom prst="rect">
+            <a:avLst/>
+          </a:prstGeom>
+          <a:noFill/>
+        </p:spPr>
+        <p:txBody>
+          <a:bodyPr wrap="square" rtlCol="0">
+            <a:spAutoFit/>
+          </a:bodyPr>
+          <a:lstStyle/>
+          <a:p>
+            <a:pPr marL="342900" indent="-342900">
+              <a:buFontTx/>
+              <a:buChar char="-"/>
+            </a:pPr>
+            <a:r>
+              <a:rPr lang="fr-FR" sz="2000" dirty="0" smtClean="0">
+                <a:solidFill>
+                  <a:schemeClr val="tx2"/>
+                </a:solidFill>
+                <a:latin typeface="Lato Regular"/>
+                <a:cs typeface="Lato Regular"/>
+              </a:rPr>
+              <a:t>Ajout </a:t>
+            </a:r>
+            <a:r>
+              <a:rPr lang="fr-FR" sz="2000" dirty="0">
+                <a:solidFill>
+                  <a:schemeClr val="tx2"/>
+                </a:solidFill>
+                <a:latin typeface="Lato Regular"/>
+                <a:cs typeface="Lato Regular"/>
+              </a:rPr>
+              <a:t>de la dépendance de </a:t>
+            </a:r>
+            <a:r>
+              <a:rPr lang="fr-FR" sz="2000" dirty="0" err="1">
+                <a:solidFill>
+                  <a:schemeClr val="tx2"/>
+                </a:solidFill>
+                <a:latin typeface="Lato Regular"/>
+                <a:cs typeface="Lato Regular"/>
+              </a:rPr>
+              <a:t>PitTest</a:t>
+            </a:r>
+            <a:endParaRPr lang="fr-FR" sz="2000" dirty="0">
+              <a:solidFill>
+                <a:schemeClr val="tx2"/>
+              </a:solidFill>
+              <a:latin typeface="Lato Regular"/>
+              <a:cs typeface="Lato Regular"/>
+            </a:endParaRPr>
+          </a:p>
+          <a:p>
+            <a:pPr marL="342900" indent="-342900">
+              <a:buFontTx/>
+              <a:buChar char="-"/>
+            </a:pPr>
+            <a:r>
+              <a:rPr lang="fr-FR" sz="2000" dirty="0">
+                <a:solidFill>
+                  <a:schemeClr val="tx2"/>
+                </a:solidFill>
+                <a:latin typeface="Lato Regular"/>
+                <a:cs typeface="Lato Regular"/>
+              </a:rPr>
+              <a:t>Mutation </a:t>
+            </a:r>
+            <a:r>
+              <a:rPr lang="fr-FR" sz="2000" dirty="0" err="1">
+                <a:solidFill>
+                  <a:schemeClr val="tx2"/>
+                </a:solidFill>
+                <a:latin typeface="Lato Regular"/>
+                <a:cs typeface="Lato Regular"/>
+              </a:rPr>
+              <a:t>coverage</a:t>
+            </a:r>
+            <a:endParaRPr lang="fr-FR" sz="2000" dirty="0">
+              <a:solidFill>
+                <a:schemeClr val="tx2"/>
+              </a:solidFill>
+              <a:latin typeface="Lato Light"/>
+              <a:cs typeface="Lato Light"/>
+            </a:endParaRPr>
+          </a:p>
+        </p:txBody>
+      </p:sp>
+    </p:spTree>
+    <p:extLst>
+      <p:ext uri="{BB962C8B-B14F-4D97-AF65-F5344CB8AC3E}">
+        <p14:creationId xmlns:p14="http://schemas.microsoft.com/office/powerpoint/2010/main" val="2810526562"/>
+      </p:ext>
+    </p:extLst>
+  </p:cSld>
+  <p:clrMapOvr>
+    <a:masterClrMapping/>
+  </p:clrMapOvr>
+  <p:timing>
+    <p:tnLst>
+      <p:par>
+        <p:cTn id="1" dur="indefinite" restart="never" nodeType="tmRoot"/>
+      </p:par>
+    </p:tnLst>
+  </p:timing>
+</p:sld>
+</file>
+
+<file path=ppt/slides/slide12.xml><?xml version="1.0" encoding="utf-8"?>
+<p:sld xmlns:a="http://schemas.openxmlformats.org/drawingml/2006/main" xmlns:r="http://schemas.openxmlformats.org/officeDocument/2006/relationships" xmlns:p="http://schemas.openxmlformats.org/presentationml/2006/main">
+  <p:cSld>
+    <p:spTree>
+      <p:nvGrpSpPr>
+        <p:cNvPr id="1" name=""/>
+        <p:cNvGrpSpPr/>
+        <p:nvPr/>
+      </p:nvGrpSpPr>
+      <p:grpSpPr>
+        <a:xfrm>
+          <a:off x="0" y="0"/>
+          <a:ext cx="0" cy="0"/>
+          <a:chOff x="0" y="0"/>
+          <a:chExt cx="0" cy="0"/>
+        </a:xfrm>
+      </p:grpSpPr>
+      <p:grpSp>
+        <p:nvGrpSpPr>
+          <p:cNvPr id="202" name="Groupe 201"/>
+          <p:cNvGrpSpPr/>
+          <p:nvPr/>
+        </p:nvGrpSpPr>
+        <p:grpSpPr>
+          <a:xfrm>
+            <a:off x="0" y="73772"/>
+            <a:ext cx="2943332" cy="883356"/>
+            <a:chOff x="0" y="-9760"/>
+            <a:chExt cx="2357120" cy="785565"/>
+          </a:xfrm>
+        </p:grpSpPr>
+        <p:sp>
+          <p:nvSpPr>
+            <p:cNvPr id="203" name="ZoneTexte 202"/>
+            <p:cNvSpPr txBox="1"/>
+            <p:nvPr/>
+          </p:nvSpPr>
+          <p:spPr>
+            <a:xfrm>
+              <a:off x="109500" y="-9760"/>
+              <a:ext cx="1506083" cy="629520"/>
+            </a:xfrm>
+            <a:prstGeom prst="rect">
+              <a:avLst/>
+            </a:prstGeom>
+            <a:noFill/>
+          </p:spPr>
+          <p:txBody>
+            <a:bodyPr wrap="none" rtlCol="0">
+              <a:spAutoFit/>
+            </a:bodyPr>
+            <a:lstStyle/>
+            <a:p>
+              <a:r>
+                <a:rPr lang="fr-FR" sz="4000" b="1" dirty="0" err="1" smtClean="0">
+                  <a:latin typeface="Lato Regular" panose="020F0502020204030203" pitchFamily="34" charset="0"/>
+                  <a:ea typeface="Lato Regular" panose="020F0502020204030203" pitchFamily="34" charset="0"/>
+                  <a:cs typeface="Lato Regular" panose="020F0502020204030203" pitchFamily="34" charset="0"/>
+                </a:rPr>
+                <a:t>Pit</a:t>
+              </a:r>
+              <a:r>
+                <a:rPr lang="fr-FR" sz="4000" b="1" dirty="0" smtClean="0">
+                  <a:latin typeface="Lato Regular" panose="020F0502020204030203" pitchFamily="34" charset="0"/>
+                  <a:ea typeface="Lato Regular" panose="020F0502020204030203" pitchFamily="34" charset="0"/>
+                  <a:cs typeface="Lato Regular" panose="020F0502020204030203" pitchFamily="34" charset="0"/>
+                </a:rPr>
+                <a:t> Test</a:t>
+              </a:r>
+              <a:endParaRPr lang="fr-FR" sz="3600" b="1" dirty="0">
+                <a:latin typeface="Lato Regular" panose="020F0502020204030203" pitchFamily="34" charset="0"/>
+                <a:ea typeface="Lato Regular" panose="020F0502020204030203" pitchFamily="34" charset="0"/>
+                <a:cs typeface="Lato Regular" panose="020F0502020204030203" pitchFamily="34" charset="0"/>
+              </a:endParaRPr>
+            </a:p>
+          </p:txBody>
+        </p:sp>
+        <p:sp>
+          <p:nvSpPr>
+            <p:cNvPr id="204" name="Rectangle 203"/>
+            <p:cNvSpPr/>
+            <p:nvPr/>
+          </p:nvSpPr>
+          <p:spPr>
+            <a:xfrm>
+              <a:off x="0" y="619760"/>
+              <a:ext cx="2357120" cy="156045"/>
+            </a:xfrm>
+            <a:prstGeom prst="rect">
+              <a:avLst/>
+            </a:prstGeom>
+            <a:solidFill>
+              <a:srgbClr val="438721"/>
+            </a:solidFill>
+            <a:ln>
+              <a:noFill/>
+            </a:ln>
+          </p:spPr>
+          <p:style>
+            <a:lnRef idx="2">
+              <a:schemeClr val="accent1">
+                <a:shade val="50000"/>
+              </a:schemeClr>
+            </a:lnRef>
+            <a:fillRef idx="1">
+              <a:schemeClr val="accent1"/>
+            </a:fillRef>
+            <a:effectRef idx="0">
+              <a:schemeClr val="accent1"/>
+            </a:effectRef>
+            <a:fontRef idx="minor">
+              <a:schemeClr val="lt1"/>
+            </a:fontRef>
+          </p:style>
+          <p:txBody>
+            <a:bodyPr rtlCol="0" anchor="ctr"/>
+            <a:lstStyle/>
+            <a:p>
+              <a:pPr algn="ctr"/>
+              <a:endParaRPr lang="fr-FR"/>
+            </a:p>
+          </p:txBody>
+        </p:sp>
+      </p:grpSp>
+      <p:pic>
+        <p:nvPicPr>
+          <p:cNvPr id="2" name="Image 1"/>
+          <p:cNvPicPr>
+            <a:picLocks noChangeAspect="1"/>
+          </p:cNvPicPr>
+          <p:nvPr/>
+        </p:nvPicPr>
+        <p:blipFill>
+          <a:blip r:embed="rId2">
+            <a:extLst>
+              <a:ext uri="{28A0092B-C50C-407E-A947-70E740481C1C}">
+                <a14:useLocalDpi xmlns:a14="http://schemas.microsoft.com/office/drawing/2010/main" val="0"/>
+              </a:ext>
+            </a:extLst>
+          </a:blip>
+          <a:stretch>
+            <a:fillRect/>
+          </a:stretch>
+        </p:blipFill>
+        <p:spPr>
+          <a:xfrm>
+            <a:off x="363882" y="1583707"/>
+            <a:ext cx="4813300" cy="4216400"/>
+          </a:xfrm>
+          <a:prstGeom prst="rect">
+            <a:avLst/>
+          </a:prstGeom>
+        </p:spPr>
+      </p:pic>
+      <p:sp>
+        <p:nvSpPr>
+          <p:cNvPr id="12" name="ZoneTexte 11"/>
+          <p:cNvSpPr txBox="1"/>
+          <p:nvPr/>
+        </p:nvSpPr>
+        <p:spPr>
+          <a:xfrm>
             <a:off x="4860123" y="1223794"/>
             <a:ext cx="5187715" cy="1015663"/>
           </a:xfrm>
@@ -11085,7 +11359,7 @@
 </p:sld>
 </file>
 
-<file path=ppt/slides/slide12.xml><?xml version="1.0" encoding="utf-8"?>
+<file path=ppt/slides/slide13.xml><?xml version="1.0" encoding="utf-8"?>
 <p:sld xmlns:a="http://schemas.openxmlformats.org/drawingml/2006/main" xmlns:r="http://schemas.openxmlformats.org/officeDocument/2006/relationships" xmlns:p="http://schemas.openxmlformats.org/presentationml/2006/main">
   <p:cSld>
     <p:spTree>
@@ -11606,7 +11880,7 @@
 </p:sld>
 </file>
 
-<file path=ppt/slides/slide13.xml><?xml version="1.0" encoding="utf-8"?>
+<file path=ppt/slides/slide14.xml><?xml version="1.0" encoding="utf-8"?>
 <p:sld xmlns:a="http://schemas.openxmlformats.org/drawingml/2006/main" xmlns:r="http://schemas.openxmlformats.org/officeDocument/2006/relationships" xmlns:p="http://schemas.openxmlformats.org/presentationml/2006/main">
   <p:cSld>
     <p:spTree>
@@ -11995,7 +12269,7 @@
 </p:sld>
 </file>
 
-<file path=ppt/slides/slide14.xml><?xml version="1.0" encoding="utf-8"?>
+<file path=ppt/slides/slide15.xml><?xml version="1.0" encoding="utf-8"?>
 <p:sld xmlns:a="http://schemas.openxmlformats.org/drawingml/2006/main" xmlns:r="http://schemas.openxmlformats.org/officeDocument/2006/relationships" xmlns:p="http://schemas.openxmlformats.org/presentationml/2006/main">
   <p:cSld>
     <p:spTree>
@@ -12363,7 +12637,7 @@
 </p:sld>
 </file>
 
-<file path=ppt/slides/slide15.xml><?xml version="1.0" encoding="utf-8"?>
+<file path=ppt/slides/slide16.xml><?xml version="1.0" encoding="utf-8"?>
 <p:sld xmlns:a="http://schemas.openxmlformats.org/drawingml/2006/main" xmlns:r="http://schemas.openxmlformats.org/officeDocument/2006/relationships" xmlns:p="http://schemas.openxmlformats.org/presentationml/2006/main">
   <p:cSld>
     <p:spTree>
@@ -13240,7 +13514,7 @@
 </p:sld>
 </file>
 
-<file path=ppt/slides/slide16.xml><?xml version="1.0" encoding="utf-8"?>
+<file path=ppt/slides/slide17.xml><?xml version="1.0" encoding="utf-8"?>
 <p:sld xmlns:a="http://schemas.openxmlformats.org/drawingml/2006/main" xmlns:r="http://schemas.openxmlformats.org/officeDocument/2006/relationships" xmlns:p="http://schemas.openxmlformats.org/presentationml/2006/main">
   <p:cSld>
     <p:spTree>
@@ -13698,7 +13972,7 @@
 </p:sld>
 </file>
 
-<file path=ppt/slides/slide17.xml><?xml version="1.0" encoding="utf-8"?>
+<file path=ppt/slides/slide18.xml><?xml version="1.0" encoding="utf-8"?>
 <p:sld xmlns:a="http://schemas.openxmlformats.org/drawingml/2006/main" xmlns:r="http://schemas.openxmlformats.org/officeDocument/2006/relationships" xmlns:p="http://schemas.openxmlformats.org/presentationml/2006/main">
   <p:cSld>
     <p:spTree>
@@ -14155,7 +14429,7 @@
 </p:sld>
 </file>
 
-<file path=ppt/slides/slide18.xml><?xml version="1.0" encoding="utf-8"?>
+<file path=ppt/slides/slide19.xml><?xml version="1.0" encoding="utf-8"?>
 <p:sld xmlns:a="http://schemas.openxmlformats.org/drawingml/2006/main" xmlns:r="http://schemas.openxmlformats.org/officeDocument/2006/relationships" xmlns:p="http://schemas.openxmlformats.org/presentationml/2006/main">
   <p:cSld>
     <p:spTree>
@@ -14443,374 +14717,6 @@
     <p:extLst>
       <p:ext uri="{BB962C8B-B14F-4D97-AF65-F5344CB8AC3E}">
         <p14:creationId xmlns:p14="http://schemas.microsoft.com/office/powerpoint/2010/main" val="114824609"/>
-      </p:ext>
-    </p:extLst>
-  </p:cSld>
-  <p:clrMapOvr>
-    <a:masterClrMapping/>
-  </p:clrMapOvr>
-  <p:timing>
-    <p:tnLst>
-      <p:par>
-        <p:cTn id="1" dur="indefinite" restart="never" nodeType="tmRoot"/>
-      </p:par>
-    </p:tnLst>
-  </p:timing>
-</p:sld>
-</file>
-
-<file path=ppt/slides/slide19.xml><?xml version="1.0" encoding="utf-8"?>
-<p:sld xmlns:a="http://schemas.openxmlformats.org/drawingml/2006/main" xmlns:r="http://schemas.openxmlformats.org/officeDocument/2006/relationships" xmlns:p="http://schemas.openxmlformats.org/presentationml/2006/main">
-  <p:cSld>
-    <p:spTree>
-      <p:nvGrpSpPr>
-        <p:cNvPr id="1" name=""/>
-        <p:cNvGrpSpPr/>
-        <p:nvPr/>
-      </p:nvGrpSpPr>
-      <p:grpSpPr>
-        <a:xfrm>
-          <a:off x="0" y="0"/>
-          <a:ext cx="0" cy="0"/>
-          <a:chOff x="0" y="0"/>
-          <a:chExt cx="0" cy="0"/>
-        </a:xfrm>
-      </p:grpSpPr>
-      <p:grpSp>
-        <p:nvGrpSpPr>
-          <p:cNvPr id="12" name="Groupe 11"/>
-          <p:cNvGrpSpPr/>
-          <p:nvPr/>
-        </p:nvGrpSpPr>
-        <p:grpSpPr>
-          <a:xfrm>
-            <a:off x="0" y="73772"/>
-            <a:ext cx="8469013" cy="883356"/>
-            <a:chOff x="0" y="-9760"/>
-            <a:chExt cx="6782276" cy="785565"/>
-          </a:xfrm>
-        </p:grpSpPr>
-        <p:sp>
-          <p:nvSpPr>
-            <p:cNvPr id="13" name="ZoneTexte 12"/>
-            <p:cNvSpPr txBox="1"/>
-            <p:nvPr/>
-          </p:nvSpPr>
-          <p:spPr>
-            <a:xfrm>
-              <a:off x="109500" y="-9760"/>
-              <a:ext cx="6672776" cy="629520"/>
-            </a:xfrm>
-            <a:prstGeom prst="rect">
-              <a:avLst/>
-            </a:prstGeom>
-            <a:noFill/>
-          </p:spPr>
-          <p:txBody>
-            <a:bodyPr wrap="none" rtlCol="0">
-              <a:spAutoFit/>
-            </a:bodyPr>
-            <a:lstStyle/>
-            <a:p>
-              <a:r>
-                <a:rPr lang="fr-FR" sz="4000" b="1" dirty="0" smtClean="0">
-                  <a:latin typeface="Lato Regular" panose="020F0502020204030203" pitchFamily="34" charset="0"/>
-                  <a:ea typeface="Lato Regular" panose="020F0502020204030203" pitchFamily="34" charset="0"/>
-                  <a:cs typeface="Lato Regular" panose="020F0502020204030203" pitchFamily="34" charset="0"/>
-                </a:rPr>
-                <a:t>Chapitre 3 : Comment devenir résilient ?</a:t>
-              </a:r>
-              <a:endParaRPr lang="fr-FR" sz="3600" b="1" dirty="0">
-                <a:latin typeface="Lato Regular" panose="020F0502020204030203" pitchFamily="34" charset="0"/>
-                <a:ea typeface="Lato Regular" panose="020F0502020204030203" pitchFamily="34" charset="0"/>
-                <a:cs typeface="Lato Regular" panose="020F0502020204030203" pitchFamily="34" charset="0"/>
-              </a:endParaRPr>
-            </a:p>
-          </p:txBody>
-        </p:sp>
-        <p:sp>
-          <p:nvSpPr>
-            <p:cNvPr id="14" name="Rectangle 13"/>
-            <p:cNvSpPr/>
-            <p:nvPr/>
-          </p:nvSpPr>
-          <p:spPr>
-            <a:xfrm>
-              <a:off x="0" y="619760"/>
-              <a:ext cx="2357120" cy="156045"/>
-            </a:xfrm>
-            <a:prstGeom prst="rect">
-              <a:avLst/>
-            </a:prstGeom>
-            <a:solidFill>
-              <a:srgbClr val="2F6079"/>
-            </a:solidFill>
-            <a:ln>
-              <a:noFill/>
-            </a:ln>
-          </p:spPr>
-          <p:style>
-            <a:lnRef idx="2">
-              <a:schemeClr val="accent1">
-                <a:shade val="50000"/>
-              </a:schemeClr>
-            </a:lnRef>
-            <a:fillRef idx="1">
-              <a:schemeClr val="accent1"/>
-            </a:fillRef>
-            <a:effectRef idx="0">
-              <a:schemeClr val="accent1"/>
-            </a:effectRef>
-            <a:fontRef idx="minor">
-              <a:schemeClr val="lt1"/>
-            </a:fontRef>
-          </p:style>
-          <p:txBody>
-            <a:bodyPr rtlCol="0" anchor="ctr"/>
-            <a:lstStyle/>
-            <a:p>
-              <a:pPr algn="ctr"/>
-              <a:endParaRPr lang="fr-FR"/>
-            </a:p>
-          </p:txBody>
-        </p:sp>
-      </p:grpSp>
-      <p:sp>
-        <p:nvSpPr>
-          <p:cNvPr id="15" name="Subtitle 2">
-            <a:extLst>
-              <a:ext uri="{FF2B5EF4-FFF2-40B4-BE49-F238E27FC236}">
-                <a16:creationId xmlns:a16="http://schemas.microsoft.com/office/drawing/2014/main" id="{3A78FA13-AC9F-47B6-87F4-D7D64D1358A9}"/>
-              </a:ext>
-            </a:extLst>
-          </p:cNvPr>
-          <p:cNvSpPr txBox="1">
-            <a:spLocks/>
-          </p:cNvSpPr>
-          <p:nvPr/>
-        </p:nvSpPr>
-        <p:spPr>
-          <a:xfrm>
-            <a:off x="305336" y="1312781"/>
-            <a:ext cx="5148087" cy="4896344"/>
-          </a:xfrm>
-          <a:prstGeom prst="rect">
-            <a:avLst/>
-          </a:prstGeom>
-        </p:spPr>
-        <p:txBody>
-          <a:bodyPr vert="horz" lIns="243744" tIns="121869" rIns="243744" bIns="121869" rtlCol="0">
-            <a:noAutofit/>
-          </a:bodyPr>
-          <a:lstStyle>
-            <a:lvl1pPr marL="342900" indent="-342900" algn="l" defTabSz="457200" rtl="0" eaLnBrk="1" latinLnBrk="0" hangingPunct="1">
-              <a:spcBef>
-                <a:spcPct val="20000"/>
-              </a:spcBef>
-              <a:buFont typeface="Arial"/>
-              <a:buChar char="•"/>
-              <a:defRPr sz="3200" kern="1200">
-                <a:solidFill>
-                  <a:schemeClr val="tx1"/>
-                </a:solidFill>
-                <a:latin typeface="+mn-lt"/>
-                <a:ea typeface="+mn-ea"/>
-                <a:cs typeface="+mn-cs"/>
-              </a:defRPr>
-            </a:lvl1pPr>
-            <a:lvl2pPr marL="742950" indent="-285750" algn="l" defTabSz="457200" rtl="0" eaLnBrk="1" latinLnBrk="0" hangingPunct="1">
-              <a:spcBef>
-                <a:spcPct val="20000"/>
-              </a:spcBef>
-              <a:buFont typeface="Arial"/>
-              <a:buChar char="–"/>
-              <a:defRPr sz="2800" kern="1200">
-                <a:solidFill>
-                  <a:schemeClr val="tx1"/>
-                </a:solidFill>
-                <a:latin typeface="+mn-lt"/>
-                <a:ea typeface="+mn-ea"/>
-                <a:cs typeface="+mn-cs"/>
-              </a:defRPr>
-            </a:lvl2pPr>
-            <a:lvl3pPr marL="1143000" indent="-228600" algn="l" defTabSz="457200" rtl="0" eaLnBrk="1" latinLnBrk="0" hangingPunct="1">
-              <a:spcBef>
-                <a:spcPct val="20000"/>
-              </a:spcBef>
-              <a:buFont typeface="Arial"/>
-              <a:buChar char="•"/>
-              <a:defRPr sz="2400" kern="1200">
-                <a:solidFill>
-                  <a:schemeClr val="tx1"/>
-                </a:solidFill>
-                <a:latin typeface="+mn-lt"/>
-                <a:ea typeface="+mn-ea"/>
-                <a:cs typeface="+mn-cs"/>
-              </a:defRPr>
-            </a:lvl3pPr>
-            <a:lvl4pPr marL="1600200" indent="-228600" algn="l" defTabSz="457200" rtl="0" eaLnBrk="1" latinLnBrk="0" hangingPunct="1">
-              <a:spcBef>
-                <a:spcPct val="20000"/>
-              </a:spcBef>
-              <a:buFont typeface="Arial"/>
-              <a:buChar char="–"/>
-              <a:defRPr sz="2000" kern="1200">
-                <a:solidFill>
-                  <a:schemeClr val="tx1"/>
-                </a:solidFill>
-                <a:latin typeface="+mn-lt"/>
-                <a:ea typeface="+mn-ea"/>
-                <a:cs typeface="+mn-cs"/>
-              </a:defRPr>
-            </a:lvl4pPr>
-            <a:lvl5pPr marL="2057400" indent="-228600" algn="l" defTabSz="457200" rtl="0" eaLnBrk="1" latinLnBrk="0" hangingPunct="1">
-              <a:spcBef>
-                <a:spcPct val="20000"/>
-              </a:spcBef>
-              <a:buFont typeface="Arial"/>
-              <a:buChar char="»"/>
-              <a:defRPr sz="2000" kern="1200">
-                <a:solidFill>
-                  <a:schemeClr val="tx1"/>
-                </a:solidFill>
-                <a:latin typeface="+mn-lt"/>
-                <a:ea typeface="+mn-ea"/>
-                <a:cs typeface="+mn-cs"/>
-              </a:defRPr>
-            </a:lvl5pPr>
-            <a:lvl6pPr marL="2514600" indent="-228600" algn="l" defTabSz="457200" rtl="0" eaLnBrk="1" latinLnBrk="0" hangingPunct="1">
-              <a:spcBef>
-                <a:spcPct val="20000"/>
-              </a:spcBef>
-              <a:buFont typeface="Arial"/>
-              <a:buChar char="•"/>
-              <a:defRPr sz="2000" kern="1200">
-                <a:solidFill>
-                  <a:schemeClr val="tx1"/>
-                </a:solidFill>
-                <a:latin typeface="+mn-lt"/>
-                <a:ea typeface="+mn-ea"/>
-                <a:cs typeface="+mn-cs"/>
-              </a:defRPr>
-            </a:lvl6pPr>
-            <a:lvl7pPr marL="2971800" indent="-228600" algn="l" defTabSz="457200" rtl="0" eaLnBrk="1" latinLnBrk="0" hangingPunct="1">
-              <a:spcBef>
-                <a:spcPct val="20000"/>
-              </a:spcBef>
-              <a:buFont typeface="Arial"/>
-              <a:buChar char="•"/>
-              <a:defRPr sz="2000" kern="1200">
-                <a:solidFill>
-                  <a:schemeClr val="tx1"/>
-                </a:solidFill>
-                <a:latin typeface="+mn-lt"/>
-                <a:ea typeface="+mn-ea"/>
-                <a:cs typeface="+mn-cs"/>
-              </a:defRPr>
-            </a:lvl7pPr>
-            <a:lvl8pPr marL="3429000" indent="-228600" algn="l" defTabSz="457200" rtl="0" eaLnBrk="1" latinLnBrk="0" hangingPunct="1">
-              <a:spcBef>
-                <a:spcPct val="20000"/>
-              </a:spcBef>
-              <a:buFont typeface="Arial"/>
-              <a:buChar char="•"/>
-              <a:defRPr sz="2000" kern="1200">
-                <a:solidFill>
-                  <a:schemeClr val="tx1"/>
-                </a:solidFill>
-                <a:latin typeface="+mn-lt"/>
-                <a:ea typeface="+mn-ea"/>
-                <a:cs typeface="+mn-cs"/>
-              </a:defRPr>
-            </a:lvl8pPr>
-            <a:lvl9pPr marL="3886200" indent="-228600" algn="l" defTabSz="457200" rtl="0" eaLnBrk="1" latinLnBrk="0" hangingPunct="1">
-              <a:spcBef>
-                <a:spcPct val="20000"/>
-              </a:spcBef>
-              <a:buFont typeface="Arial"/>
-              <a:buChar char="•"/>
-              <a:defRPr sz="2000" kern="1200">
-                <a:solidFill>
-                  <a:schemeClr val="tx1"/>
-                </a:solidFill>
-                <a:latin typeface="+mn-lt"/>
-                <a:ea typeface="+mn-ea"/>
-                <a:cs typeface="+mn-cs"/>
-              </a:defRPr>
-            </a:lvl9pPr>
-          </a:lstStyle>
-          <a:p>
-            <a:pPr marL="0" indent="0">
-              <a:buNone/>
-            </a:pPr>
-            <a:r>
-              <a:rPr lang="fr-FR" sz="2000" dirty="0" smtClean="0">
-                <a:solidFill>
-                  <a:schemeClr val="tx2"/>
-                </a:solidFill>
-                <a:latin typeface="Lato Regular"/>
-                <a:cs typeface="Lato Regular"/>
-              </a:rPr>
-              <a:t>Scénario</a:t>
-            </a:r>
-            <a:endParaRPr lang="fr-FR" sz="1800" dirty="0">
-              <a:solidFill>
-                <a:schemeClr val="tx2"/>
-              </a:solidFill>
-              <a:latin typeface="Lato Regular"/>
-              <a:cs typeface="Lato Regular"/>
-            </a:endParaRPr>
-          </a:p>
-          <a:p>
-            <a:pPr marL="0" indent="0">
-              <a:buNone/>
-            </a:pPr>
-            <a:endParaRPr lang="fr-FR" sz="1600" dirty="0">
-              <a:solidFill>
-                <a:schemeClr val="tx2"/>
-              </a:solidFill>
-              <a:latin typeface="Lato Light"/>
-              <a:cs typeface="Lato Light"/>
-            </a:endParaRPr>
-          </a:p>
-        </p:txBody>
-      </p:sp>
-      <p:sp>
-        <p:nvSpPr>
-          <p:cNvPr id="4" name="Rectangle 3"/>
-          <p:cNvSpPr/>
-          <p:nvPr/>
-        </p:nvSpPr>
-        <p:spPr>
-          <a:xfrm>
-            <a:off x="647700" y="2086553"/>
-            <a:ext cx="6096000" cy="1200329"/>
-          </a:xfrm>
-          <a:prstGeom prst="rect">
-            <a:avLst/>
-          </a:prstGeom>
-        </p:spPr>
-        <p:txBody>
-          <a:bodyPr>
-            <a:spAutoFit/>
-          </a:bodyPr>
-          <a:lstStyle/>
-          <a:p>
-            <a:r>
-              <a:rPr lang="fr-FR" dirty="0">
-                <a:latin typeface="Lato Light" panose="020F0502020204030203" pitchFamily="34" charset="0"/>
-                <a:ea typeface="Lato Light" panose="020F0502020204030203" pitchFamily="34" charset="0"/>
-                <a:cs typeface="Lato Light" panose="020F0502020204030203" pitchFamily="34" charset="0"/>
-              </a:rPr>
-              <a:t>"Le constat est fait : ok, notre applicatif répond.. mais est vraiment très sensibles aux pannes!” Comment rendre notre application vraiment résiliente ? Comment palier à ce genre de problèmes ?"</a:t>
-            </a:r>
-          </a:p>
-        </p:txBody>
-      </p:sp>
-    </p:spTree>
-    <p:extLst>
-      <p:ext uri="{BB962C8B-B14F-4D97-AF65-F5344CB8AC3E}">
-        <p14:creationId xmlns:p14="http://schemas.microsoft.com/office/powerpoint/2010/main" val="785186874"/>
       </p:ext>
     </p:extLst>
   </p:cSld>
@@ -15185,6 +15091,374 @@
 </file>
 
 <file path=ppt/slides/slide20.xml><?xml version="1.0" encoding="utf-8"?>
+<p:sld xmlns:a="http://schemas.openxmlformats.org/drawingml/2006/main" xmlns:r="http://schemas.openxmlformats.org/officeDocument/2006/relationships" xmlns:p="http://schemas.openxmlformats.org/presentationml/2006/main">
+  <p:cSld>
+    <p:spTree>
+      <p:nvGrpSpPr>
+        <p:cNvPr id="1" name=""/>
+        <p:cNvGrpSpPr/>
+        <p:nvPr/>
+      </p:nvGrpSpPr>
+      <p:grpSpPr>
+        <a:xfrm>
+          <a:off x="0" y="0"/>
+          <a:ext cx="0" cy="0"/>
+          <a:chOff x="0" y="0"/>
+          <a:chExt cx="0" cy="0"/>
+        </a:xfrm>
+      </p:grpSpPr>
+      <p:grpSp>
+        <p:nvGrpSpPr>
+          <p:cNvPr id="12" name="Groupe 11"/>
+          <p:cNvGrpSpPr/>
+          <p:nvPr/>
+        </p:nvGrpSpPr>
+        <p:grpSpPr>
+          <a:xfrm>
+            <a:off x="0" y="73772"/>
+            <a:ext cx="8469013" cy="883356"/>
+            <a:chOff x="0" y="-9760"/>
+            <a:chExt cx="6782276" cy="785565"/>
+          </a:xfrm>
+        </p:grpSpPr>
+        <p:sp>
+          <p:nvSpPr>
+            <p:cNvPr id="13" name="ZoneTexte 12"/>
+            <p:cNvSpPr txBox="1"/>
+            <p:nvPr/>
+          </p:nvSpPr>
+          <p:spPr>
+            <a:xfrm>
+              <a:off x="109500" y="-9760"/>
+              <a:ext cx="6672776" cy="629520"/>
+            </a:xfrm>
+            <a:prstGeom prst="rect">
+              <a:avLst/>
+            </a:prstGeom>
+            <a:noFill/>
+          </p:spPr>
+          <p:txBody>
+            <a:bodyPr wrap="none" rtlCol="0">
+              <a:spAutoFit/>
+            </a:bodyPr>
+            <a:lstStyle/>
+            <a:p>
+              <a:r>
+                <a:rPr lang="fr-FR" sz="4000" b="1" dirty="0" smtClean="0">
+                  <a:latin typeface="Lato Regular" panose="020F0502020204030203" pitchFamily="34" charset="0"/>
+                  <a:ea typeface="Lato Regular" panose="020F0502020204030203" pitchFamily="34" charset="0"/>
+                  <a:cs typeface="Lato Regular" panose="020F0502020204030203" pitchFamily="34" charset="0"/>
+                </a:rPr>
+                <a:t>Chapitre 3 : Comment devenir résilient ?</a:t>
+              </a:r>
+              <a:endParaRPr lang="fr-FR" sz="3600" b="1" dirty="0">
+                <a:latin typeface="Lato Regular" panose="020F0502020204030203" pitchFamily="34" charset="0"/>
+                <a:ea typeface="Lato Regular" panose="020F0502020204030203" pitchFamily="34" charset="0"/>
+                <a:cs typeface="Lato Regular" panose="020F0502020204030203" pitchFamily="34" charset="0"/>
+              </a:endParaRPr>
+            </a:p>
+          </p:txBody>
+        </p:sp>
+        <p:sp>
+          <p:nvSpPr>
+            <p:cNvPr id="14" name="Rectangle 13"/>
+            <p:cNvSpPr/>
+            <p:nvPr/>
+          </p:nvSpPr>
+          <p:spPr>
+            <a:xfrm>
+              <a:off x="0" y="619760"/>
+              <a:ext cx="2357120" cy="156045"/>
+            </a:xfrm>
+            <a:prstGeom prst="rect">
+              <a:avLst/>
+            </a:prstGeom>
+            <a:solidFill>
+              <a:srgbClr val="2F6079"/>
+            </a:solidFill>
+            <a:ln>
+              <a:noFill/>
+            </a:ln>
+          </p:spPr>
+          <p:style>
+            <a:lnRef idx="2">
+              <a:schemeClr val="accent1">
+                <a:shade val="50000"/>
+              </a:schemeClr>
+            </a:lnRef>
+            <a:fillRef idx="1">
+              <a:schemeClr val="accent1"/>
+            </a:fillRef>
+            <a:effectRef idx="0">
+              <a:schemeClr val="accent1"/>
+            </a:effectRef>
+            <a:fontRef idx="minor">
+              <a:schemeClr val="lt1"/>
+            </a:fontRef>
+          </p:style>
+          <p:txBody>
+            <a:bodyPr rtlCol="0" anchor="ctr"/>
+            <a:lstStyle/>
+            <a:p>
+              <a:pPr algn="ctr"/>
+              <a:endParaRPr lang="fr-FR"/>
+            </a:p>
+          </p:txBody>
+        </p:sp>
+      </p:grpSp>
+      <p:sp>
+        <p:nvSpPr>
+          <p:cNvPr id="15" name="Subtitle 2">
+            <a:extLst>
+              <a:ext uri="{FF2B5EF4-FFF2-40B4-BE49-F238E27FC236}">
+                <a16:creationId xmlns:a16="http://schemas.microsoft.com/office/drawing/2014/main" id="{3A78FA13-AC9F-47B6-87F4-D7D64D1358A9}"/>
+              </a:ext>
+            </a:extLst>
+          </p:cNvPr>
+          <p:cNvSpPr txBox="1">
+            <a:spLocks/>
+          </p:cNvSpPr>
+          <p:nvPr/>
+        </p:nvSpPr>
+        <p:spPr>
+          <a:xfrm>
+            <a:off x="305336" y="1312781"/>
+            <a:ext cx="5148087" cy="4896344"/>
+          </a:xfrm>
+          <a:prstGeom prst="rect">
+            <a:avLst/>
+          </a:prstGeom>
+        </p:spPr>
+        <p:txBody>
+          <a:bodyPr vert="horz" lIns="243744" tIns="121869" rIns="243744" bIns="121869" rtlCol="0">
+            <a:noAutofit/>
+          </a:bodyPr>
+          <a:lstStyle>
+            <a:lvl1pPr marL="342900" indent="-342900" algn="l" defTabSz="457200" rtl="0" eaLnBrk="1" latinLnBrk="0" hangingPunct="1">
+              <a:spcBef>
+                <a:spcPct val="20000"/>
+              </a:spcBef>
+              <a:buFont typeface="Arial"/>
+              <a:buChar char="•"/>
+              <a:defRPr sz="3200" kern="1200">
+                <a:solidFill>
+                  <a:schemeClr val="tx1"/>
+                </a:solidFill>
+                <a:latin typeface="+mn-lt"/>
+                <a:ea typeface="+mn-ea"/>
+                <a:cs typeface="+mn-cs"/>
+              </a:defRPr>
+            </a:lvl1pPr>
+            <a:lvl2pPr marL="742950" indent="-285750" algn="l" defTabSz="457200" rtl="0" eaLnBrk="1" latinLnBrk="0" hangingPunct="1">
+              <a:spcBef>
+                <a:spcPct val="20000"/>
+              </a:spcBef>
+              <a:buFont typeface="Arial"/>
+              <a:buChar char="–"/>
+              <a:defRPr sz="2800" kern="1200">
+                <a:solidFill>
+                  <a:schemeClr val="tx1"/>
+                </a:solidFill>
+                <a:latin typeface="+mn-lt"/>
+                <a:ea typeface="+mn-ea"/>
+                <a:cs typeface="+mn-cs"/>
+              </a:defRPr>
+            </a:lvl2pPr>
+            <a:lvl3pPr marL="1143000" indent="-228600" algn="l" defTabSz="457200" rtl="0" eaLnBrk="1" latinLnBrk="0" hangingPunct="1">
+              <a:spcBef>
+                <a:spcPct val="20000"/>
+              </a:spcBef>
+              <a:buFont typeface="Arial"/>
+              <a:buChar char="•"/>
+              <a:defRPr sz="2400" kern="1200">
+                <a:solidFill>
+                  <a:schemeClr val="tx1"/>
+                </a:solidFill>
+                <a:latin typeface="+mn-lt"/>
+                <a:ea typeface="+mn-ea"/>
+                <a:cs typeface="+mn-cs"/>
+              </a:defRPr>
+            </a:lvl3pPr>
+            <a:lvl4pPr marL="1600200" indent="-228600" algn="l" defTabSz="457200" rtl="0" eaLnBrk="1" latinLnBrk="0" hangingPunct="1">
+              <a:spcBef>
+                <a:spcPct val="20000"/>
+              </a:spcBef>
+              <a:buFont typeface="Arial"/>
+              <a:buChar char="–"/>
+              <a:defRPr sz="2000" kern="1200">
+                <a:solidFill>
+                  <a:schemeClr val="tx1"/>
+                </a:solidFill>
+                <a:latin typeface="+mn-lt"/>
+                <a:ea typeface="+mn-ea"/>
+                <a:cs typeface="+mn-cs"/>
+              </a:defRPr>
+            </a:lvl4pPr>
+            <a:lvl5pPr marL="2057400" indent="-228600" algn="l" defTabSz="457200" rtl="0" eaLnBrk="1" latinLnBrk="0" hangingPunct="1">
+              <a:spcBef>
+                <a:spcPct val="20000"/>
+              </a:spcBef>
+              <a:buFont typeface="Arial"/>
+              <a:buChar char="»"/>
+              <a:defRPr sz="2000" kern="1200">
+                <a:solidFill>
+                  <a:schemeClr val="tx1"/>
+                </a:solidFill>
+                <a:latin typeface="+mn-lt"/>
+                <a:ea typeface="+mn-ea"/>
+                <a:cs typeface="+mn-cs"/>
+              </a:defRPr>
+            </a:lvl5pPr>
+            <a:lvl6pPr marL="2514600" indent="-228600" algn="l" defTabSz="457200" rtl="0" eaLnBrk="1" latinLnBrk="0" hangingPunct="1">
+              <a:spcBef>
+                <a:spcPct val="20000"/>
+              </a:spcBef>
+              <a:buFont typeface="Arial"/>
+              <a:buChar char="•"/>
+              <a:defRPr sz="2000" kern="1200">
+                <a:solidFill>
+                  <a:schemeClr val="tx1"/>
+                </a:solidFill>
+                <a:latin typeface="+mn-lt"/>
+                <a:ea typeface="+mn-ea"/>
+                <a:cs typeface="+mn-cs"/>
+              </a:defRPr>
+            </a:lvl6pPr>
+            <a:lvl7pPr marL="2971800" indent="-228600" algn="l" defTabSz="457200" rtl="0" eaLnBrk="1" latinLnBrk="0" hangingPunct="1">
+              <a:spcBef>
+                <a:spcPct val="20000"/>
+              </a:spcBef>
+              <a:buFont typeface="Arial"/>
+              <a:buChar char="•"/>
+              <a:defRPr sz="2000" kern="1200">
+                <a:solidFill>
+                  <a:schemeClr val="tx1"/>
+                </a:solidFill>
+                <a:latin typeface="+mn-lt"/>
+                <a:ea typeface="+mn-ea"/>
+                <a:cs typeface="+mn-cs"/>
+              </a:defRPr>
+            </a:lvl7pPr>
+            <a:lvl8pPr marL="3429000" indent="-228600" algn="l" defTabSz="457200" rtl="0" eaLnBrk="1" latinLnBrk="0" hangingPunct="1">
+              <a:spcBef>
+                <a:spcPct val="20000"/>
+              </a:spcBef>
+              <a:buFont typeface="Arial"/>
+              <a:buChar char="•"/>
+              <a:defRPr sz="2000" kern="1200">
+                <a:solidFill>
+                  <a:schemeClr val="tx1"/>
+                </a:solidFill>
+                <a:latin typeface="+mn-lt"/>
+                <a:ea typeface="+mn-ea"/>
+                <a:cs typeface="+mn-cs"/>
+              </a:defRPr>
+            </a:lvl8pPr>
+            <a:lvl9pPr marL="3886200" indent="-228600" algn="l" defTabSz="457200" rtl="0" eaLnBrk="1" latinLnBrk="0" hangingPunct="1">
+              <a:spcBef>
+                <a:spcPct val="20000"/>
+              </a:spcBef>
+              <a:buFont typeface="Arial"/>
+              <a:buChar char="•"/>
+              <a:defRPr sz="2000" kern="1200">
+                <a:solidFill>
+                  <a:schemeClr val="tx1"/>
+                </a:solidFill>
+                <a:latin typeface="+mn-lt"/>
+                <a:ea typeface="+mn-ea"/>
+                <a:cs typeface="+mn-cs"/>
+              </a:defRPr>
+            </a:lvl9pPr>
+          </a:lstStyle>
+          <a:p>
+            <a:pPr marL="0" indent="0">
+              <a:buNone/>
+            </a:pPr>
+            <a:r>
+              <a:rPr lang="fr-FR" sz="2000" dirty="0" smtClean="0">
+                <a:solidFill>
+                  <a:schemeClr val="tx2"/>
+                </a:solidFill>
+                <a:latin typeface="Lato Regular"/>
+                <a:cs typeface="Lato Regular"/>
+              </a:rPr>
+              <a:t>Scénario</a:t>
+            </a:r>
+            <a:endParaRPr lang="fr-FR" sz="1800" dirty="0">
+              <a:solidFill>
+                <a:schemeClr val="tx2"/>
+              </a:solidFill>
+              <a:latin typeface="Lato Regular"/>
+              <a:cs typeface="Lato Regular"/>
+            </a:endParaRPr>
+          </a:p>
+          <a:p>
+            <a:pPr marL="0" indent="0">
+              <a:buNone/>
+            </a:pPr>
+            <a:endParaRPr lang="fr-FR" sz="1600" dirty="0">
+              <a:solidFill>
+                <a:schemeClr val="tx2"/>
+              </a:solidFill>
+              <a:latin typeface="Lato Light"/>
+              <a:cs typeface="Lato Light"/>
+            </a:endParaRPr>
+          </a:p>
+        </p:txBody>
+      </p:sp>
+      <p:sp>
+        <p:nvSpPr>
+          <p:cNvPr id="4" name="Rectangle 3"/>
+          <p:cNvSpPr/>
+          <p:nvPr/>
+        </p:nvSpPr>
+        <p:spPr>
+          <a:xfrm>
+            <a:off x="647700" y="2086553"/>
+            <a:ext cx="6096000" cy="1200329"/>
+          </a:xfrm>
+          <a:prstGeom prst="rect">
+            <a:avLst/>
+          </a:prstGeom>
+        </p:spPr>
+        <p:txBody>
+          <a:bodyPr>
+            <a:spAutoFit/>
+          </a:bodyPr>
+          <a:lstStyle/>
+          <a:p>
+            <a:r>
+              <a:rPr lang="fr-FR" dirty="0">
+                <a:latin typeface="Lato Light" panose="020F0502020204030203" pitchFamily="34" charset="0"/>
+                <a:ea typeface="Lato Light" panose="020F0502020204030203" pitchFamily="34" charset="0"/>
+                <a:cs typeface="Lato Light" panose="020F0502020204030203" pitchFamily="34" charset="0"/>
+              </a:rPr>
+              <a:t>"Le constat est fait : ok, notre applicatif répond.. mais est vraiment très sensibles aux pannes!” Comment rendre notre application vraiment résiliente ? Comment palier à ce genre de problèmes ?"</a:t>
+            </a:r>
+          </a:p>
+        </p:txBody>
+      </p:sp>
+    </p:spTree>
+    <p:extLst>
+      <p:ext uri="{BB962C8B-B14F-4D97-AF65-F5344CB8AC3E}">
+        <p14:creationId xmlns:p14="http://schemas.microsoft.com/office/powerpoint/2010/main" val="785186874"/>
+      </p:ext>
+    </p:extLst>
+  </p:cSld>
+  <p:clrMapOvr>
+    <a:masterClrMapping/>
+  </p:clrMapOvr>
+  <p:timing>
+    <p:tnLst>
+      <p:par>
+        <p:cTn id="1" dur="indefinite" restart="never" nodeType="tmRoot"/>
+      </p:par>
+    </p:tnLst>
+  </p:timing>
+</p:sld>
+</file>
+
+<file path=ppt/slides/slide21.xml><?xml version="1.0" encoding="utf-8"?>
 <p:sld xmlns:a="http://schemas.openxmlformats.org/drawingml/2006/main" xmlns:r="http://schemas.openxmlformats.org/officeDocument/2006/relationships" xmlns:p="http://schemas.openxmlformats.org/presentationml/2006/main">
   <p:cSld>
     <p:spTree>
@@ -15848,7 +16122,7 @@
 </p:sld>
 </file>
 
-<file path=ppt/slides/slide21.xml><?xml version="1.0" encoding="utf-8"?>
+<file path=ppt/slides/slide22.xml><?xml version="1.0" encoding="utf-8"?>
 <p:sld xmlns:a="http://schemas.openxmlformats.org/drawingml/2006/main" xmlns:r="http://schemas.openxmlformats.org/officeDocument/2006/relationships" xmlns:p="http://schemas.openxmlformats.org/presentationml/2006/main">
   <p:cSld>
     <p:spTree>
@@ -16295,422 +16569,6 @@
 </p:sld>
 </file>
 
-<file path=ppt/slides/slide22.xml><?xml version="1.0" encoding="utf-8"?>
-<p:sld xmlns:a="http://schemas.openxmlformats.org/drawingml/2006/main" xmlns:r="http://schemas.openxmlformats.org/officeDocument/2006/relationships" xmlns:p="http://schemas.openxmlformats.org/presentationml/2006/main">
-  <p:cSld>
-    <p:spTree>
-      <p:nvGrpSpPr>
-        <p:cNvPr id="1" name=""/>
-        <p:cNvGrpSpPr/>
-        <p:nvPr/>
-      </p:nvGrpSpPr>
-      <p:grpSpPr>
-        <a:xfrm>
-          <a:off x="0" y="0"/>
-          <a:ext cx="0" cy="0"/>
-          <a:chOff x="0" y="0"/>
-          <a:chExt cx="0" cy="0"/>
-        </a:xfrm>
-      </p:grpSpPr>
-      <p:grpSp>
-        <p:nvGrpSpPr>
-          <p:cNvPr id="202" name="Groupe 201"/>
-          <p:cNvGrpSpPr/>
-          <p:nvPr/>
-        </p:nvGrpSpPr>
-        <p:grpSpPr>
-          <a:xfrm>
-            <a:off x="0" y="73772"/>
-            <a:ext cx="6722061" cy="883356"/>
-            <a:chOff x="0" y="-9760"/>
-            <a:chExt cx="5383255" cy="785565"/>
-          </a:xfrm>
-        </p:grpSpPr>
-        <p:sp>
-          <p:nvSpPr>
-            <p:cNvPr id="203" name="ZoneTexte 202"/>
-            <p:cNvSpPr txBox="1"/>
-            <p:nvPr/>
-          </p:nvSpPr>
-          <p:spPr>
-            <a:xfrm>
-              <a:off x="109500" y="-9760"/>
-              <a:ext cx="5273755" cy="629520"/>
-            </a:xfrm>
-            <a:prstGeom prst="rect">
-              <a:avLst/>
-            </a:prstGeom>
-            <a:noFill/>
-          </p:spPr>
-          <p:txBody>
-            <a:bodyPr wrap="none" rtlCol="0">
-              <a:spAutoFit/>
-            </a:bodyPr>
-            <a:lstStyle/>
-            <a:p>
-              <a:r>
-                <a:rPr lang="fr-FR" sz="4000" b="1" dirty="0" smtClean="0">
-                  <a:latin typeface="Lato Regular" panose="020F0502020204030203" pitchFamily="34" charset="0"/>
-                  <a:ea typeface="Lato Regular" panose="020F0502020204030203" pitchFamily="34" charset="0"/>
-                  <a:cs typeface="Lato Regular" panose="020F0502020204030203" pitchFamily="34" charset="0"/>
-                </a:rPr>
-                <a:t>Analyse du second tir de charge</a:t>
-              </a:r>
-              <a:endParaRPr lang="fr-FR" sz="3600" b="1" dirty="0">
-                <a:latin typeface="Lato Regular" panose="020F0502020204030203" pitchFamily="34" charset="0"/>
-                <a:ea typeface="Lato Regular" panose="020F0502020204030203" pitchFamily="34" charset="0"/>
-                <a:cs typeface="Lato Regular" panose="020F0502020204030203" pitchFamily="34" charset="0"/>
-              </a:endParaRPr>
-            </a:p>
-          </p:txBody>
-        </p:sp>
-        <p:sp>
-          <p:nvSpPr>
-            <p:cNvPr id="204" name="Rectangle 203"/>
-            <p:cNvSpPr/>
-            <p:nvPr/>
-          </p:nvSpPr>
-          <p:spPr>
-            <a:xfrm>
-              <a:off x="0" y="619760"/>
-              <a:ext cx="2357120" cy="156045"/>
-            </a:xfrm>
-            <a:prstGeom prst="rect">
-              <a:avLst/>
-            </a:prstGeom>
-            <a:solidFill>
-              <a:srgbClr val="872163"/>
-            </a:solidFill>
-            <a:ln>
-              <a:noFill/>
-            </a:ln>
-          </p:spPr>
-          <p:style>
-            <a:lnRef idx="2">
-              <a:schemeClr val="accent1">
-                <a:shade val="50000"/>
-              </a:schemeClr>
-            </a:lnRef>
-            <a:fillRef idx="1">
-              <a:schemeClr val="accent1"/>
-            </a:fillRef>
-            <a:effectRef idx="0">
-              <a:schemeClr val="accent1"/>
-            </a:effectRef>
-            <a:fontRef idx="minor">
-              <a:schemeClr val="lt1"/>
-            </a:fontRef>
-          </p:style>
-          <p:txBody>
-            <a:bodyPr rtlCol="0" anchor="ctr"/>
-            <a:lstStyle/>
-            <a:p>
-              <a:pPr algn="ctr"/>
-              <a:endParaRPr lang="fr-FR"/>
-            </a:p>
-          </p:txBody>
-        </p:sp>
-      </p:grpSp>
-      <p:sp>
-        <p:nvSpPr>
-          <p:cNvPr id="4" name="Rectangle 3"/>
-          <p:cNvSpPr/>
-          <p:nvPr/>
-        </p:nvSpPr>
-        <p:spPr>
-          <a:xfrm>
-            <a:off x="1280160" y="6228859"/>
-            <a:ext cx="10348377" cy="369332"/>
-          </a:xfrm>
-          <a:prstGeom prst="rect">
-            <a:avLst/>
-          </a:prstGeom>
-        </p:spPr>
-        <p:txBody>
-          <a:bodyPr wrap="square">
-            <a:spAutoFit/>
-          </a:bodyPr>
-          <a:lstStyle/>
-          <a:p>
-            <a:pPr algn="ctr"/>
-            <a:r>
-              <a:rPr lang="fr-FR" dirty="0">
-                <a:latin typeface="Lato Regular" panose="020F0502020204030203" pitchFamily="34" charset="0"/>
-                <a:ea typeface="Lato Regular" panose="020F0502020204030203" pitchFamily="34" charset="0"/>
-                <a:cs typeface="Lato Regular" panose="020F0502020204030203" pitchFamily="34" charset="0"/>
-              </a:rPr>
-              <a:t>Tir :  C:\dev\gatling-maven-plugin-demo\target\gatling\basicsimulation-nbtir\index.html</a:t>
-            </a:r>
-          </a:p>
-        </p:txBody>
-      </p:sp>
-      <p:sp>
-        <p:nvSpPr>
-          <p:cNvPr id="12" name="Subtitle 2">
-            <a:extLst>
-              <a:ext uri="{FF2B5EF4-FFF2-40B4-BE49-F238E27FC236}">
-                <a16:creationId xmlns:a16="http://schemas.microsoft.com/office/drawing/2014/main" id="{3A78FA13-AC9F-47B6-87F4-D7D64D1358A9}"/>
-              </a:ext>
-            </a:extLst>
-          </p:cNvPr>
-          <p:cNvSpPr txBox="1">
-            <a:spLocks/>
-          </p:cNvSpPr>
-          <p:nvPr/>
-        </p:nvSpPr>
-        <p:spPr>
-          <a:xfrm>
-            <a:off x="322908" y="1350474"/>
-            <a:ext cx="6510153" cy="502532"/>
-          </a:xfrm>
-          <a:prstGeom prst="rect">
-            <a:avLst/>
-          </a:prstGeom>
-        </p:spPr>
-        <p:txBody>
-          <a:bodyPr vert="horz" lIns="243744" tIns="121869" rIns="243744" bIns="121869" rtlCol="0">
-            <a:noAutofit/>
-          </a:bodyPr>
-          <a:lstStyle>
-            <a:lvl1pPr marL="342900" indent="-342900" algn="l" defTabSz="457200" rtl="0" eaLnBrk="1" latinLnBrk="0" hangingPunct="1">
-              <a:spcBef>
-                <a:spcPct val="20000"/>
-              </a:spcBef>
-              <a:buFont typeface="Arial"/>
-              <a:buChar char="•"/>
-              <a:defRPr sz="3200" kern="1200">
-                <a:solidFill>
-                  <a:schemeClr val="tx1"/>
-                </a:solidFill>
-                <a:latin typeface="+mn-lt"/>
-                <a:ea typeface="+mn-ea"/>
-                <a:cs typeface="+mn-cs"/>
-              </a:defRPr>
-            </a:lvl1pPr>
-            <a:lvl2pPr marL="742950" indent="-285750" algn="l" defTabSz="457200" rtl="0" eaLnBrk="1" latinLnBrk="0" hangingPunct="1">
-              <a:spcBef>
-                <a:spcPct val="20000"/>
-              </a:spcBef>
-              <a:buFont typeface="Arial"/>
-              <a:buChar char="–"/>
-              <a:defRPr sz="2800" kern="1200">
-                <a:solidFill>
-                  <a:schemeClr val="tx1"/>
-                </a:solidFill>
-                <a:latin typeface="+mn-lt"/>
-                <a:ea typeface="+mn-ea"/>
-                <a:cs typeface="+mn-cs"/>
-              </a:defRPr>
-            </a:lvl2pPr>
-            <a:lvl3pPr marL="1143000" indent="-228600" algn="l" defTabSz="457200" rtl="0" eaLnBrk="1" latinLnBrk="0" hangingPunct="1">
-              <a:spcBef>
-                <a:spcPct val="20000"/>
-              </a:spcBef>
-              <a:buFont typeface="Arial"/>
-              <a:buChar char="•"/>
-              <a:defRPr sz="2400" kern="1200">
-                <a:solidFill>
-                  <a:schemeClr val="tx1"/>
-                </a:solidFill>
-                <a:latin typeface="+mn-lt"/>
-                <a:ea typeface="+mn-ea"/>
-                <a:cs typeface="+mn-cs"/>
-              </a:defRPr>
-            </a:lvl3pPr>
-            <a:lvl4pPr marL="1600200" indent="-228600" algn="l" defTabSz="457200" rtl="0" eaLnBrk="1" latinLnBrk="0" hangingPunct="1">
-              <a:spcBef>
-                <a:spcPct val="20000"/>
-              </a:spcBef>
-              <a:buFont typeface="Arial"/>
-              <a:buChar char="–"/>
-              <a:defRPr sz="2000" kern="1200">
-                <a:solidFill>
-                  <a:schemeClr val="tx1"/>
-                </a:solidFill>
-                <a:latin typeface="+mn-lt"/>
-                <a:ea typeface="+mn-ea"/>
-                <a:cs typeface="+mn-cs"/>
-              </a:defRPr>
-            </a:lvl4pPr>
-            <a:lvl5pPr marL="2057400" indent="-228600" algn="l" defTabSz="457200" rtl="0" eaLnBrk="1" latinLnBrk="0" hangingPunct="1">
-              <a:spcBef>
-                <a:spcPct val="20000"/>
-              </a:spcBef>
-              <a:buFont typeface="Arial"/>
-              <a:buChar char="»"/>
-              <a:defRPr sz="2000" kern="1200">
-                <a:solidFill>
-                  <a:schemeClr val="tx1"/>
-                </a:solidFill>
-                <a:latin typeface="+mn-lt"/>
-                <a:ea typeface="+mn-ea"/>
-                <a:cs typeface="+mn-cs"/>
-              </a:defRPr>
-            </a:lvl5pPr>
-            <a:lvl6pPr marL="2514600" indent="-228600" algn="l" defTabSz="457200" rtl="0" eaLnBrk="1" latinLnBrk="0" hangingPunct="1">
-              <a:spcBef>
-                <a:spcPct val="20000"/>
-              </a:spcBef>
-              <a:buFont typeface="Arial"/>
-              <a:buChar char="•"/>
-              <a:defRPr sz="2000" kern="1200">
-                <a:solidFill>
-                  <a:schemeClr val="tx1"/>
-                </a:solidFill>
-                <a:latin typeface="+mn-lt"/>
-                <a:ea typeface="+mn-ea"/>
-                <a:cs typeface="+mn-cs"/>
-              </a:defRPr>
-            </a:lvl6pPr>
-            <a:lvl7pPr marL="2971800" indent="-228600" algn="l" defTabSz="457200" rtl="0" eaLnBrk="1" latinLnBrk="0" hangingPunct="1">
-              <a:spcBef>
-                <a:spcPct val="20000"/>
-              </a:spcBef>
-              <a:buFont typeface="Arial"/>
-              <a:buChar char="•"/>
-              <a:defRPr sz="2000" kern="1200">
-                <a:solidFill>
-                  <a:schemeClr val="tx1"/>
-                </a:solidFill>
-                <a:latin typeface="+mn-lt"/>
-                <a:ea typeface="+mn-ea"/>
-                <a:cs typeface="+mn-cs"/>
-              </a:defRPr>
-            </a:lvl7pPr>
-            <a:lvl8pPr marL="3429000" indent="-228600" algn="l" defTabSz="457200" rtl="0" eaLnBrk="1" latinLnBrk="0" hangingPunct="1">
-              <a:spcBef>
-                <a:spcPct val="20000"/>
-              </a:spcBef>
-              <a:buFont typeface="Arial"/>
-              <a:buChar char="•"/>
-              <a:defRPr sz="2000" kern="1200">
-                <a:solidFill>
-                  <a:schemeClr val="tx1"/>
-                </a:solidFill>
-                <a:latin typeface="+mn-lt"/>
-                <a:ea typeface="+mn-ea"/>
-                <a:cs typeface="+mn-cs"/>
-              </a:defRPr>
-            </a:lvl8pPr>
-            <a:lvl9pPr marL="3886200" indent="-228600" algn="l" defTabSz="457200" rtl="0" eaLnBrk="1" latinLnBrk="0" hangingPunct="1">
-              <a:spcBef>
-                <a:spcPct val="20000"/>
-              </a:spcBef>
-              <a:buFont typeface="Arial"/>
-              <a:buChar char="•"/>
-              <a:defRPr sz="2000" kern="1200">
-                <a:solidFill>
-                  <a:schemeClr val="tx1"/>
-                </a:solidFill>
-                <a:latin typeface="+mn-lt"/>
-                <a:ea typeface="+mn-ea"/>
-                <a:cs typeface="+mn-cs"/>
-              </a:defRPr>
-            </a:lvl9pPr>
-          </a:lstStyle>
-          <a:p>
-            <a:pPr marL="0" indent="0" algn="ctr">
-              <a:buNone/>
-            </a:pPr>
-            <a:r>
-              <a:rPr lang="fr-FR" sz="2000" dirty="0" smtClean="0">
-                <a:solidFill>
-                  <a:schemeClr val="tx2"/>
-                </a:solidFill>
-                <a:latin typeface="Lato Regular"/>
-                <a:cs typeface="Lato Regular"/>
-              </a:rPr>
-              <a:t>Résultat du tir de charge avec 1 réplicas par service :</a:t>
-            </a:r>
-            <a:endParaRPr lang="fr-FR" sz="1600" dirty="0">
-              <a:solidFill>
-                <a:schemeClr val="tx2"/>
-              </a:solidFill>
-              <a:latin typeface="Lato Light"/>
-              <a:cs typeface="Lato Light"/>
-            </a:endParaRPr>
-          </a:p>
-        </p:txBody>
-      </p:sp>
-      <p:pic>
-        <p:nvPicPr>
-          <p:cNvPr id="13" name="Image 12"/>
-          <p:cNvPicPr>
-            <a:picLocks noChangeAspect="1"/>
-          </p:cNvPicPr>
-          <p:nvPr/>
-        </p:nvPicPr>
-        <p:blipFill rotWithShape="1">
-          <a:blip r:embed="rId3">
-            <a:extLst>
-              <a:ext uri="{28A0092B-C50C-407E-A947-70E740481C1C}">
-                <a14:useLocalDpi xmlns:a14="http://schemas.microsoft.com/office/drawing/2010/main" val="0"/>
-              </a:ext>
-            </a:extLst>
-          </a:blip>
-          <a:srcRect l="38750" t="22204" r="38372" b="39045"/>
-          <a:stretch/>
-        </p:blipFill>
-        <p:spPr>
-          <a:xfrm>
-            <a:off x="322909" y="2085526"/>
-            <a:ext cx="2297511" cy="3891279"/>
-          </a:xfrm>
-          <a:prstGeom prst="rect">
-            <a:avLst/>
-          </a:prstGeom>
-        </p:spPr>
-      </p:pic>
-      <p:pic>
-        <p:nvPicPr>
-          <p:cNvPr id="3" name="Image 2"/>
-          <p:cNvPicPr>
-            <a:picLocks noChangeAspect="1"/>
-          </p:cNvPicPr>
-          <p:nvPr/>
-        </p:nvPicPr>
-        <p:blipFill>
-          <a:blip r:embed="rId4">
-            <a:extLst>
-              <a:ext uri="{28A0092B-C50C-407E-A947-70E740481C1C}">
-                <a14:useLocalDpi xmlns:a14="http://schemas.microsoft.com/office/drawing/2010/main" val="0"/>
-              </a:ext>
-            </a:extLst>
-          </a:blip>
-          <a:stretch>
-            <a:fillRect/>
-          </a:stretch>
-        </p:blipFill>
-        <p:spPr>
-          <a:xfrm>
-            <a:off x="2676697" y="2136790"/>
-            <a:ext cx="9409147" cy="3788749"/>
-          </a:xfrm>
-          <a:prstGeom prst="rect">
-            <a:avLst/>
-          </a:prstGeom>
-        </p:spPr>
-      </p:pic>
-    </p:spTree>
-    <p:extLst>
-      <p:ext uri="{BB962C8B-B14F-4D97-AF65-F5344CB8AC3E}">
-        <p14:creationId xmlns:p14="http://schemas.microsoft.com/office/powerpoint/2010/main" val="4190241344"/>
-      </p:ext>
-    </p:extLst>
-  </p:cSld>
-  <p:clrMapOvr>
-    <a:masterClrMapping/>
-  </p:clrMapOvr>
-  <p:timing>
-    <p:tnLst>
-      <p:par>
-        <p:cTn id="1" dur="indefinite" restart="never" nodeType="tmRoot"/>
-      </p:par>
-    </p:tnLst>
-  </p:timing>
-</p:sld>
-</file>
-
 <file path=ppt/slides/slide23.xml><?xml version="1.0" encoding="utf-8"?>
 <p:sld xmlns:a="http://schemas.openxmlformats.org/drawingml/2006/main" xmlns:r="http://schemas.openxmlformats.org/officeDocument/2006/relationships" xmlns:p="http://schemas.openxmlformats.org/presentationml/2006/main">
   <p:cSld>
@@ -17036,6 +16894,422 @@
                 <a:latin typeface="Lato Regular"/>
                 <a:cs typeface="Lato Regular"/>
               </a:rPr>
+              <a:t>Résultat du tir de charge avec 1 réplicas par service :</a:t>
+            </a:r>
+            <a:endParaRPr lang="fr-FR" sz="1600" dirty="0">
+              <a:solidFill>
+                <a:schemeClr val="tx2"/>
+              </a:solidFill>
+              <a:latin typeface="Lato Light"/>
+              <a:cs typeface="Lato Light"/>
+            </a:endParaRPr>
+          </a:p>
+        </p:txBody>
+      </p:sp>
+      <p:pic>
+        <p:nvPicPr>
+          <p:cNvPr id="13" name="Image 12"/>
+          <p:cNvPicPr>
+            <a:picLocks noChangeAspect="1"/>
+          </p:cNvPicPr>
+          <p:nvPr/>
+        </p:nvPicPr>
+        <p:blipFill rotWithShape="1">
+          <a:blip r:embed="rId3">
+            <a:extLst>
+              <a:ext uri="{28A0092B-C50C-407E-A947-70E740481C1C}">
+                <a14:useLocalDpi xmlns:a14="http://schemas.microsoft.com/office/drawing/2010/main" val="0"/>
+              </a:ext>
+            </a:extLst>
+          </a:blip>
+          <a:srcRect l="38750" t="22204" r="38372" b="39045"/>
+          <a:stretch/>
+        </p:blipFill>
+        <p:spPr>
+          <a:xfrm>
+            <a:off x="322909" y="2085526"/>
+            <a:ext cx="2297511" cy="3891279"/>
+          </a:xfrm>
+          <a:prstGeom prst="rect">
+            <a:avLst/>
+          </a:prstGeom>
+        </p:spPr>
+      </p:pic>
+      <p:pic>
+        <p:nvPicPr>
+          <p:cNvPr id="3" name="Image 2"/>
+          <p:cNvPicPr>
+            <a:picLocks noChangeAspect="1"/>
+          </p:cNvPicPr>
+          <p:nvPr/>
+        </p:nvPicPr>
+        <p:blipFill>
+          <a:blip r:embed="rId4">
+            <a:extLst>
+              <a:ext uri="{28A0092B-C50C-407E-A947-70E740481C1C}">
+                <a14:useLocalDpi xmlns:a14="http://schemas.microsoft.com/office/drawing/2010/main" val="0"/>
+              </a:ext>
+            </a:extLst>
+          </a:blip>
+          <a:stretch>
+            <a:fillRect/>
+          </a:stretch>
+        </p:blipFill>
+        <p:spPr>
+          <a:xfrm>
+            <a:off x="2676697" y="2136790"/>
+            <a:ext cx="9409147" cy="3788749"/>
+          </a:xfrm>
+          <a:prstGeom prst="rect">
+            <a:avLst/>
+          </a:prstGeom>
+        </p:spPr>
+      </p:pic>
+    </p:spTree>
+    <p:extLst>
+      <p:ext uri="{BB962C8B-B14F-4D97-AF65-F5344CB8AC3E}">
+        <p14:creationId xmlns:p14="http://schemas.microsoft.com/office/powerpoint/2010/main" val="4190241344"/>
+      </p:ext>
+    </p:extLst>
+  </p:cSld>
+  <p:clrMapOvr>
+    <a:masterClrMapping/>
+  </p:clrMapOvr>
+  <p:timing>
+    <p:tnLst>
+      <p:par>
+        <p:cTn id="1" dur="indefinite" restart="never" nodeType="tmRoot"/>
+      </p:par>
+    </p:tnLst>
+  </p:timing>
+</p:sld>
+</file>
+
+<file path=ppt/slides/slide24.xml><?xml version="1.0" encoding="utf-8"?>
+<p:sld xmlns:a="http://schemas.openxmlformats.org/drawingml/2006/main" xmlns:r="http://schemas.openxmlformats.org/officeDocument/2006/relationships" xmlns:p="http://schemas.openxmlformats.org/presentationml/2006/main">
+  <p:cSld>
+    <p:spTree>
+      <p:nvGrpSpPr>
+        <p:cNvPr id="1" name=""/>
+        <p:cNvGrpSpPr/>
+        <p:nvPr/>
+      </p:nvGrpSpPr>
+      <p:grpSpPr>
+        <a:xfrm>
+          <a:off x="0" y="0"/>
+          <a:ext cx="0" cy="0"/>
+          <a:chOff x="0" y="0"/>
+          <a:chExt cx="0" cy="0"/>
+        </a:xfrm>
+      </p:grpSpPr>
+      <p:grpSp>
+        <p:nvGrpSpPr>
+          <p:cNvPr id="202" name="Groupe 201"/>
+          <p:cNvGrpSpPr/>
+          <p:nvPr/>
+        </p:nvGrpSpPr>
+        <p:grpSpPr>
+          <a:xfrm>
+            <a:off x="0" y="73772"/>
+            <a:ext cx="6722061" cy="883356"/>
+            <a:chOff x="0" y="-9760"/>
+            <a:chExt cx="5383255" cy="785565"/>
+          </a:xfrm>
+        </p:grpSpPr>
+        <p:sp>
+          <p:nvSpPr>
+            <p:cNvPr id="203" name="ZoneTexte 202"/>
+            <p:cNvSpPr txBox="1"/>
+            <p:nvPr/>
+          </p:nvSpPr>
+          <p:spPr>
+            <a:xfrm>
+              <a:off x="109500" y="-9760"/>
+              <a:ext cx="5273755" cy="629520"/>
+            </a:xfrm>
+            <a:prstGeom prst="rect">
+              <a:avLst/>
+            </a:prstGeom>
+            <a:noFill/>
+          </p:spPr>
+          <p:txBody>
+            <a:bodyPr wrap="none" rtlCol="0">
+              <a:spAutoFit/>
+            </a:bodyPr>
+            <a:lstStyle/>
+            <a:p>
+              <a:r>
+                <a:rPr lang="fr-FR" sz="4000" b="1" dirty="0" smtClean="0">
+                  <a:latin typeface="Lato Regular" panose="020F0502020204030203" pitchFamily="34" charset="0"/>
+                  <a:ea typeface="Lato Regular" panose="020F0502020204030203" pitchFamily="34" charset="0"/>
+                  <a:cs typeface="Lato Regular" panose="020F0502020204030203" pitchFamily="34" charset="0"/>
+                </a:rPr>
+                <a:t>Analyse du second tir de charge</a:t>
+              </a:r>
+              <a:endParaRPr lang="fr-FR" sz="3600" b="1" dirty="0">
+                <a:latin typeface="Lato Regular" panose="020F0502020204030203" pitchFamily="34" charset="0"/>
+                <a:ea typeface="Lato Regular" panose="020F0502020204030203" pitchFamily="34" charset="0"/>
+                <a:cs typeface="Lato Regular" panose="020F0502020204030203" pitchFamily="34" charset="0"/>
+              </a:endParaRPr>
+            </a:p>
+          </p:txBody>
+        </p:sp>
+        <p:sp>
+          <p:nvSpPr>
+            <p:cNvPr id="204" name="Rectangle 203"/>
+            <p:cNvSpPr/>
+            <p:nvPr/>
+          </p:nvSpPr>
+          <p:spPr>
+            <a:xfrm>
+              <a:off x="0" y="619760"/>
+              <a:ext cx="2357120" cy="156045"/>
+            </a:xfrm>
+            <a:prstGeom prst="rect">
+              <a:avLst/>
+            </a:prstGeom>
+            <a:solidFill>
+              <a:srgbClr val="872163"/>
+            </a:solidFill>
+            <a:ln>
+              <a:noFill/>
+            </a:ln>
+          </p:spPr>
+          <p:style>
+            <a:lnRef idx="2">
+              <a:schemeClr val="accent1">
+                <a:shade val="50000"/>
+              </a:schemeClr>
+            </a:lnRef>
+            <a:fillRef idx="1">
+              <a:schemeClr val="accent1"/>
+            </a:fillRef>
+            <a:effectRef idx="0">
+              <a:schemeClr val="accent1"/>
+            </a:effectRef>
+            <a:fontRef idx="minor">
+              <a:schemeClr val="lt1"/>
+            </a:fontRef>
+          </p:style>
+          <p:txBody>
+            <a:bodyPr rtlCol="0" anchor="ctr"/>
+            <a:lstStyle/>
+            <a:p>
+              <a:pPr algn="ctr"/>
+              <a:endParaRPr lang="fr-FR"/>
+            </a:p>
+          </p:txBody>
+        </p:sp>
+      </p:grpSp>
+      <p:sp>
+        <p:nvSpPr>
+          <p:cNvPr id="4" name="Rectangle 3"/>
+          <p:cNvSpPr/>
+          <p:nvPr/>
+        </p:nvSpPr>
+        <p:spPr>
+          <a:xfrm>
+            <a:off x="1280160" y="6228859"/>
+            <a:ext cx="10348377" cy="369332"/>
+          </a:xfrm>
+          <a:prstGeom prst="rect">
+            <a:avLst/>
+          </a:prstGeom>
+        </p:spPr>
+        <p:txBody>
+          <a:bodyPr wrap="square">
+            <a:spAutoFit/>
+          </a:bodyPr>
+          <a:lstStyle/>
+          <a:p>
+            <a:pPr algn="ctr"/>
+            <a:r>
+              <a:rPr lang="fr-FR" dirty="0">
+                <a:latin typeface="Lato Regular" panose="020F0502020204030203" pitchFamily="34" charset="0"/>
+                <a:ea typeface="Lato Regular" panose="020F0502020204030203" pitchFamily="34" charset="0"/>
+                <a:cs typeface="Lato Regular" panose="020F0502020204030203" pitchFamily="34" charset="0"/>
+              </a:rPr>
+              <a:t>Tir :  C:\dev\gatling-maven-plugin-demo\target\gatling\basicsimulation-nbtir\index.html</a:t>
+            </a:r>
+          </a:p>
+        </p:txBody>
+      </p:sp>
+      <p:sp>
+        <p:nvSpPr>
+          <p:cNvPr id="12" name="Subtitle 2">
+            <a:extLst>
+              <a:ext uri="{FF2B5EF4-FFF2-40B4-BE49-F238E27FC236}">
+                <a16:creationId xmlns:a16="http://schemas.microsoft.com/office/drawing/2014/main" id="{3A78FA13-AC9F-47B6-87F4-D7D64D1358A9}"/>
+              </a:ext>
+            </a:extLst>
+          </p:cNvPr>
+          <p:cNvSpPr txBox="1">
+            <a:spLocks/>
+          </p:cNvSpPr>
+          <p:nvPr/>
+        </p:nvSpPr>
+        <p:spPr>
+          <a:xfrm>
+            <a:off x="322908" y="1350474"/>
+            <a:ext cx="6510153" cy="502532"/>
+          </a:xfrm>
+          <a:prstGeom prst="rect">
+            <a:avLst/>
+          </a:prstGeom>
+        </p:spPr>
+        <p:txBody>
+          <a:bodyPr vert="horz" lIns="243744" tIns="121869" rIns="243744" bIns="121869" rtlCol="0">
+            <a:noAutofit/>
+          </a:bodyPr>
+          <a:lstStyle>
+            <a:lvl1pPr marL="342900" indent="-342900" algn="l" defTabSz="457200" rtl="0" eaLnBrk="1" latinLnBrk="0" hangingPunct="1">
+              <a:spcBef>
+                <a:spcPct val="20000"/>
+              </a:spcBef>
+              <a:buFont typeface="Arial"/>
+              <a:buChar char="•"/>
+              <a:defRPr sz="3200" kern="1200">
+                <a:solidFill>
+                  <a:schemeClr val="tx1"/>
+                </a:solidFill>
+                <a:latin typeface="+mn-lt"/>
+                <a:ea typeface="+mn-ea"/>
+                <a:cs typeface="+mn-cs"/>
+              </a:defRPr>
+            </a:lvl1pPr>
+            <a:lvl2pPr marL="742950" indent="-285750" algn="l" defTabSz="457200" rtl="0" eaLnBrk="1" latinLnBrk="0" hangingPunct="1">
+              <a:spcBef>
+                <a:spcPct val="20000"/>
+              </a:spcBef>
+              <a:buFont typeface="Arial"/>
+              <a:buChar char="–"/>
+              <a:defRPr sz="2800" kern="1200">
+                <a:solidFill>
+                  <a:schemeClr val="tx1"/>
+                </a:solidFill>
+                <a:latin typeface="+mn-lt"/>
+                <a:ea typeface="+mn-ea"/>
+                <a:cs typeface="+mn-cs"/>
+              </a:defRPr>
+            </a:lvl2pPr>
+            <a:lvl3pPr marL="1143000" indent="-228600" algn="l" defTabSz="457200" rtl="0" eaLnBrk="1" latinLnBrk="0" hangingPunct="1">
+              <a:spcBef>
+                <a:spcPct val="20000"/>
+              </a:spcBef>
+              <a:buFont typeface="Arial"/>
+              <a:buChar char="•"/>
+              <a:defRPr sz="2400" kern="1200">
+                <a:solidFill>
+                  <a:schemeClr val="tx1"/>
+                </a:solidFill>
+                <a:latin typeface="+mn-lt"/>
+                <a:ea typeface="+mn-ea"/>
+                <a:cs typeface="+mn-cs"/>
+              </a:defRPr>
+            </a:lvl3pPr>
+            <a:lvl4pPr marL="1600200" indent="-228600" algn="l" defTabSz="457200" rtl="0" eaLnBrk="1" latinLnBrk="0" hangingPunct="1">
+              <a:spcBef>
+                <a:spcPct val="20000"/>
+              </a:spcBef>
+              <a:buFont typeface="Arial"/>
+              <a:buChar char="–"/>
+              <a:defRPr sz="2000" kern="1200">
+                <a:solidFill>
+                  <a:schemeClr val="tx1"/>
+                </a:solidFill>
+                <a:latin typeface="+mn-lt"/>
+                <a:ea typeface="+mn-ea"/>
+                <a:cs typeface="+mn-cs"/>
+              </a:defRPr>
+            </a:lvl4pPr>
+            <a:lvl5pPr marL="2057400" indent="-228600" algn="l" defTabSz="457200" rtl="0" eaLnBrk="1" latinLnBrk="0" hangingPunct="1">
+              <a:spcBef>
+                <a:spcPct val="20000"/>
+              </a:spcBef>
+              <a:buFont typeface="Arial"/>
+              <a:buChar char="»"/>
+              <a:defRPr sz="2000" kern="1200">
+                <a:solidFill>
+                  <a:schemeClr val="tx1"/>
+                </a:solidFill>
+                <a:latin typeface="+mn-lt"/>
+                <a:ea typeface="+mn-ea"/>
+                <a:cs typeface="+mn-cs"/>
+              </a:defRPr>
+            </a:lvl5pPr>
+            <a:lvl6pPr marL="2514600" indent="-228600" algn="l" defTabSz="457200" rtl="0" eaLnBrk="1" latinLnBrk="0" hangingPunct="1">
+              <a:spcBef>
+                <a:spcPct val="20000"/>
+              </a:spcBef>
+              <a:buFont typeface="Arial"/>
+              <a:buChar char="•"/>
+              <a:defRPr sz="2000" kern="1200">
+                <a:solidFill>
+                  <a:schemeClr val="tx1"/>
+                </a:solidFill>
+                <a:latin typeface="+mn-lt"/>
+                <a:ea typeface="+mn-ea"/>
+                <a:cs typeface="+mn-cs"/>
+              </a:defRPr>
+            </a:lvl6pPr>
+            <a:lvl7pPr marL="2971800" indent="-228600" algn="l" defTabSz="457200" rtl="0" eaLnBrk="1" latinLnBrk="0" hangingPunct="1">
+              <a:spcBef>
+                <a:spcPct val="20000"/>
+              </a:spcBef>
+              <a:buFont typeface="Arial"/>
+              <a:buChar char="•"/>
+              <a:defRPr sz="2000" kern="1200">
+                <a:solidFill>
+                  <a:schemeClr val="tx1"/>
+                </a:solidFill>
+                <a:latin typeface="+mn-lt"/>
+                <a:ea typeface="+mn-ea"/>
+                <a:cs typeface="+mn-cs"/>
+              </a:defRPr>
+            </a:lvl7pPr>
+            <a:lvl8pPr marL="3429000" indent="-228600" algn="l" defTabSz="457200" rtl="0" eaLnBrk="1" latinLnBrk="0" hangingPunct="1">
+              <a:spcBef>
+                <a:spcPct val="20000"/>
+              </a:spcBef>
+              <a:buFont typeface="Arial"/>
+              <a:buChar char="•"/>
+              <a:defRPr sz="2000" kern="1200">
+                <a:solidFill>
+                  <a:schemeClr val="tx1"/>
+                </a:solidFill>
+                <a:latin typeface="+mn-lt"/>
+                <a:ea typeface="+mn-ea"/>
+                <a:cs typeface="+mn-cs"/>
+              </a:defRPr>
+            </a:lvl8pPr>
+            <a:lvl9pPr marL="3886200" indent="-228600" algn="l" defTabSz="457200" rtl="0" eaLnBrk="1" latinLnBrk="0" hangingPunct="1">
+              <a:spcBef>
+                <a:spcPct val="20000"/>
+              </a:spcBef>
+              <a:buFont typeface="Arial"/>
+              <a:buChar char="•"/>
+              <a:defRPr sz="2000" kern="1200">
+                <a:solidFill>
+                  <a:schemeClr val="tx1"/>
+                </a:solidFill>
+                <a:latin typeface="+mn-lt"/>
+                <a:ea typeface="+mn-ea"/>
+                <a:cs typeface="+mn-cs"/>
+              </a:defRPr>
+            </a:lvl9pPr>
+          </a:lstStyle>
+          <a:p>
+            <a:pPr marL="0" indent="0" algn="ctr">
+              <a:buNone/>
+            </a:pPr>
+            <a:r>
+              <a:rPr lang="fr-FR" sz="2000" dirty="0" smtClean="0">
+                <a:solidFill>
+                  <a:schemeClr val="tx2"/>
+                </a:solidFill>
+                <a:latin typeface="Lato Regular"/>
+                <a:cs typeface="Lato Regular"/>
+              </a:rPr>
               <a:t>Résultat du tir de charge avec 3 réplicas par service :</a:t>
             </a:r>
             <a:endParaRPr lang="fr-FR" sz="1600" dirty="0">
@@ -17127,7 +17401,7 @@
 </p:sld>
 </file>
 
-<file path=ppt/slides/slide24.xml><?xml version="1.0" encoding="utf-8"?>
+<file path=ppt/slides/slide25.xml><?xml version="1.0" encoding="utf-8"?>
 <p:sld xmlns:a="http://schemas.openxmlformats.org/drawingml/2006/main" xmlns:r="http://schemas.openxmlformats.org/officeDocument/2006/relationships" xmlns:p="http://schemas.openxmlformats.org/presentationml/2006/main">
   <p:cSld>
     <p:spTree>
@@ -17478,7 +17752,7 @@
 </p:sld>
 </file>
 
-<file path=ppt/slides/slide25.xml><?xml version="1.0" encoding="utf-8"?>
+<file path=ppt/slides/slide26.xml><?xml version="1.0" encoding="utf-8"?>
 <p:sld xmlns:a="http://schemas.openxmlformats.org/drawingml/2006/main" xmlns:r="http://schemas.openxmlformats.org/officeDocument/2006/relationships" xmlns:p="http://schemas.openxmlformats.org/presentationml/2006/main">
   <p:cSld>
     <p:spTree>
@@ -17701,7 +17975,7 @@
 </p:sld>
 </file>
 
-<file path=ppt/slides/slide26.xml><?xml version="1.0" encoding="utf-8"?>
+<file path=ppt/slides/slide27.xml><?xml version="1.0" encoding="utf-8"?>
 <p:sld xmlns:a="http://schemas.openxmlformats.org/drawingml/2006/main" xmlns:r="http://schemas.openxmlformats.org/officeDocument/2006/relationships" xmlns:p="http://schemas.openxmlformats.org/presentationml/2006/main">
   <p:cSld>
     <p:spTree>
@@ -18085,7 +18359,7 @@
 </p:sld>
 </file>
 
-<file path=ppt/slides/slide27.xml><?xml version="1.0" encoding="utf-8"?>
+<file path=ppt/slides/slide28.xml><?xml version="1.0" encoding="utf-8"?>
 <p:sld xmlns:a="http://schemas.openxmlformats.org/drawingml/2006/main" xmlns:r="http://schemas.openxmlformats.org/officeDocument/2006/relationships" xmlns:p="http://schemas.openxmlformats.org/presentationml/2006/main">
   <p:cSld>
     <p:spTree>
@@ -18254,7 +18528,7 @@
 </p:sld>
 </file>
 
-<file path=ppt/slides/slide28.xml><?xml version="1.0" encoding="utf-8"?>
+<file path=ppt/slides/slide29.xml><?xml version="1.0" encoding="utf-8"?>
 <p:sld xmlns:a="http://schemas.openxmlformats.org/drawingml/2006/main" xmlns:r="http://schemas.openxmlformats.org/officeDocument/2006/relationships" xmlns:p="http://schemas.openxmlformats.org/presentationml/2006/main">
   <p:cSld>
     <p:spTree>

</xml_diff>